<commit_message>
# fixed animations glitches in live Meeting # added puntos claves
</commit_message>
<xml_diff>
--- a/CreandoAplicacionesMediaConAzureMediaServices.pptx
+++ b/CreandoAplicacionesMediaConAzureMediaServices.pptx
@@ -5,10 +5,10 @@
     <p:sldMasterId id="2147483648" r:id="rId8"/>
   </p:sldMasterIdLst>
   <p:notesMasterIdLst>
-    <p:notesMasterId r:id="rId34"/>
+    <p:notesMasterId r:id="rId35"/>
   </p:notesMasterIdLst>
   <p:handoutMasterIdLst>
-    <p:handoutMasterId r:id="rId35"/>
+    <p:handoutMasterId r:id="rId36"/>
   </p:handoutMasterIdLst>
   <p:sldIdLst>
     <p:sldId id="256" r:id="rId9"/>
@@ -35,7 +35,8 @@
     <p:sldId id="301" r:id="rId30"/>
     <p:sldId id="302" r:id="rId31"/>
     <p:sldId id="297" r:id="rId32"/>
-    <p:sldId id="292" r:id="rId33"/>
+    <p:sldId id="305" r:id="rId33"/>
+    <p:sldId id="292" r:id="rId34"/>
   </p:sldIdLst>
   <p:sldSz cx="12192000" cy="6858000"/>
   <p:notesSz cx="6858000" cy="9144000"/>
@@ -238,7 +239,7 @@
           <a:p>
             <a:fld id="{613A14B3-8559-4970-90EE-E59DB1155D6D}" type="datetimeFigureOut">
               <a:rPr lang="es-AR" smtClean="0"/>
-              <a:t>28/08/2013</a:t>
+              <a:t>29/08/2013</a:t>
             </a:fld>
             <a:endParaRPr lang="es-AR"/>
           </a:p>
@@ -403,7 +404,7 @@
           <a:p>
             <a:fld id="{13FAE345-DC7A-4A21-AE56-67BAE98EA3BD}" type="datetimeFigureOut">
               <a:rPr lang="es-AR" smtClean="0"/>
-              <a:t>28/08/2013</a:t>
+              <a:t>29/08/2013</a:t>
             </a:fld>
             <a:endParaRPr lang="es-AR"/>
           </a:p>
@@ -1213,6 +1214,235 @@
     <p:extLst>
       <p:ext uri="{BB962C8B-B14F-4D97-AF65-F5344CB8AC3E}">
         <p14:creationId xmlns:p14="http://schemas.microsoft.com/office/powerpoint/2010/main" val="2283961480"/>
+      </p:ext>
+    </p:extLst>
+  </p:cSld>
+  <p:clrMapOvr>
+    <a:masterClrMapping/>
+  </p:clrMapOvr>
+</p:notes>
+</file>
+
+<file path=ppt/notesSlides/notesSlide15.xml><?xml version="1.0" encoding="utf-8"?>
+<p:notes xmlns:a="http://schemas.openxmlformats.org/drawingml/2006/main" xmlns:r="http://schemas.openxmlformats.org/officeDocument/2006/relationships" xmlns:p="http://schemas.openxmlformats.org/presentationml/2006/main">
+  <p:cSld>
+    <p:spTree>
+      <p:nvGrpSpPr>
+        <p:cNvPr id="1" name=""/>
+        <p:cNvGrpSpPr/>
+        <p:nvPr/>
+      </p:nvGrpSpPr>
+      <p:grpSpPr>
+        <a:xfrm>
+          <a:off x="0" y="0"/>
+          <a:ext cx="0" cy="0"/>
+          <a:chOff x="0" y="0"/>
+          <a:chExt cx="0" cy="0"/>
+        </a:xfrm>
+      </p:grpSpPr>
+      <p:sp>
+        <p:nvSpPr>
+          <p:cNvPr id="2" name="Slide Image Placeholder 1"/>
+          <p:cNvSpPr>
+            <a:spLocks noGrp="1" noRot="1" noChangeAspect="1"/>
+          </p:cNvSpPr>
+          <p:nvPr>
+            <p:ph type="sldImg"/>
+          </p:nvPr>
+        </p:nvSpPr>
+        <p:spPr>
+          <a:xfrm>
+            <a:off x="381000" y="685800"/>
+            <a:ext cx="6096000" cy="3429000"/>
+          </a:xfrm>
+        </p:spPr>
+      </p:sp>
+      <p:sp>
+        <p:nvSpPr>
+          <p:cNvPr id="3" name="Notes Placeholder 2"/>
+          <p:cNvSpPr>
+            <a:spLocks noGrp="1"/>
+          </p:cNvSpPr>
+          <p:nvPr>
+            <p:ph type="body" idx="1"/>
+          </p:nvPr>
+        </p:nvSpPr>
+        <p:spPr/>
+        <p:txBody>
+          <a:bodyPr>
+            <a:normAutofit/>
+          </a:bodyPr>
+          <a:lstStyle/>
+          <a:p>
+            <a:pPr lvl="0"/>
+            <a:endParaRPr lang="en-US" sz="1200" kern="1200" dirty="0" smtClean="0">
+              <a:solidFill>
+                <a:schemeClr val="tx1"/>
+              </a:solidFill>
+              <a:latin typeface="Segoe UI" pitchFamily="34" charset="0"/>
+              <a:ea typeface="+mn-ea"/>
+              <a:cs typeface="+mn-cs"/>
+            </a:endParaRPr>
+          </a:p>
+        </p:txBody>
+      </p:sp>
+      <p:sp>
+        <p:nvSpPr>
+          <p:cNvPr id="8" name="Date Placeholder 7"/>
+          <p:cNvSpPr>
+            <a:spLocks noGrp="1"/>
+          </p:cNvSpPr>
+          <p:nvPr>
+            <p:ph type="dt" idx="10"/>
+          </p:nvPr>
+        </p:nvSpPr>
+        <p:spPr/>
+        <p:txBody>
+          <a:bodyPr/>
+          <a:lstStyle/>
+          <a:p>
+            <a:fld id="{2EC64DE5-4A80-4049-BDC7-E36CCA811281}" type="datetime1">
+              <a:rPr lang="en-US" smtClean="0">
+                <a:solidFill>
+                  <a:prstClr val="black"/>
+                </a:solidFill>
+              </a:rPr>
+              <a:pPr/>
+              <a:t>8/29/2013</a:t>
+            </a:fld>
+            <a:endParaRPr lang="en-US" dirty="0">
+              <a:solidFill>
+                <a:prstClr val="black"/>
+              </a:solidFill>
+            </a:endParaRPr>
+          </a:p>
+        </p:txBody>
+      </p:sp>
+      <p:sp>
+        <p:nvSpPr>
+          <p:cNvPr id="9" name="Footer Placeholder 8"/>
+          <p:cNvSpPr>
+            <a:spLocks noGrp="1"/>
+          </p:cNvSpPr>
+          <p:nvPr>
+            <p:ph type="ftr" sz="quarter" idx="11"/>
+          </p:nvPr>
+        </p:nvSpPr>
+        <p:spPr/>
+        <p:txBody>
+          <a:bodyPr/>
+          <a:lstStyle/>
+          <a:p>
+            <a:r>
+              <a:rPr lang="en-US" dirty="0" smtClean="0">
+                <a:solidFill>
+                  <a:srgbClr val="000000"/>
+                </a:solidFill>
+                <a:latin typeface="Segoe UI" pitchFamily="34" charset="0"/>
+              </a:rPr>
+              <a:t>© 2012 Microsoft Corporation. All rights reserved. Microsoft, Windows, Windows Vista and other product names are or may be registered trademarks and/or trademarks in the U.S. and/or other countries.</a:t>
+            </a:r>
+          </a:p>
+          <a:p>
+            <a:r>
+              <a:rPr lang="en-US" dirty="0" smtClean="0">
+                <a:solidFill>
+                  <a:srgbClr val="000000"/>
+                </a:solidFill>
+                <a:latin typeface="Segoe UI" pitchFamily="34" charset="0"/>
+              </a:rPr>
+              <a:t>The information herein is for informational purposes only and represents the current view of Microsoft Corporation as of the date of this presentation. Because Microsoft must respond to changing market conditions, it should not be interpreted to be a commitment on the part of Microsoft, and Microsoft cannot guarantee the accuracy of any information provided after the date of this presentation. </a:t>
+            </a:r>
+            <a:br>
+              <a:rPr lang="en-US" dirty="0" smtClean="0">
+                <a:solidFill>
+                  <a:srgbClr val="000000"/>
+                </a:solidFill>
+                <a:latin typeface="Segoe UI" pitchFamily="34" charset="0"/>
+              </a:rPr>
+            </a:br>
+            <a:r>
+              <a:rPr lang="en-US" dirty="0" smtClean="0">
+                <a:solidFill>
+                  <a:srgbClr val="000000"/>
+                </a:solidFill>
+                <a:latin typeface="Segoe UI" pitchFamily="34" charset="0"/>
+              </a:rPr>
+              <a:t>MICROSOFT MAKES NO WARRANTIES, EXPRESS, IMPLIED OR STATUTORY, AS TO THE INFORMATION IN THIS PRESENTATION.</a:t>
+            </a:r>
+          </a:p>
+        </p:txBody>
+      </p:sp>
+      <p:sp>
+        <p:nvSpPr>
+          <p:cNvPr id="10" name="Slide Number Placeholder 9"/>
+          <p:cNvSpPr>
+            <a:spLocks noGrp="1"/>
+          </p:cNvSpPr>
+          <p:nvPr>
+            <p:ph type="sldNum" sz="quarter" idx="12"/>
+          </p:nvPr>
+        </p:nvSpPr>
+        <p:spPr/>
+        <p:txBody>
+          <a:bodyPr/>
+          <a:lstStyle/>
+          <a:p>
+            <a:fld id="{8B263312-38AA-4E1E-B2B5-0F8F122B24FE}" type="slidenum">
+              <a:rPr lang="en-US" smtClean="0">
+                <a:solidFill>
+                  <a:prstClr val="black"/>
+                </a:solidFill>
+              </a:rPr>
+              <a:pPr/>
+              <a:t>25</a:t>
+            </a:fld>
+            <a:endParaRPr lang="en-US" dirty="0">
+              <a:solidFill>
+                <a:prstClr val="black"/>
+              </a:solidFill>
+            </a:endParaRPr>
+          </a:p>
+        </p:txBody>
+      </p:sp>
+      <p:sp>
+        <p:nvSpPr>
+          <p:cNvPr id="11" name="Header Placeholder 10"/>
+          <p:cNvSpPr>
+            <a:spLocks noGrp="1"/>
+          </p:cNvSpPr>
+          <p:nvPr>
+            <p:ph type="hdr" sz="quarter" idx="13"/>
+          </p:nvPr>
+        </p:nvSpPr>
+        <p:spPr/>
+        <p:txBody>
+          <a:bodyPr/>
+          <a:lstStyle/>
+          <a:p>
+            <a:r>
+              <a:rPr lang="en-US" dirty="0" err="1" smtClean="0">
+                <a:solidFill>
+                  <a:prstClr val="black"/>
+                </a:solidFill>
+              </a:rPr>
+              <a:t>TechReady</a:t>
+            </a:r>
+            <a:r>
+              <a:rPr lang="en-US" dirty="0" smtClean="0">
+                <a:solidFill>
+                  <a:prstClr val="black"/>
+                </a:solidFill>
+              </a:rPr>
+              <a:t> 14</a:t>
+            </a:r>
+          </a:p>
+        </p:txBody>
+      </p:sp>
+    </p:spTree>
+    <p:extLst>
+      <p:ext uri="{BB962C8B-B14F-4D97-AF65-F5344CB8AC3E}">
+        <p14:creationId xmlns:p14="http://schemas.microsoft.com/office/powerpoint/2010/main" val="419600789"/>
       </p:ext>
     </p:extLst>
   </p:cSld>
@@ -2193,7 +2423,7 @@
           <a:p>
             <a:fld id="{7DF3FB16-FEC0-49EF-85A3-AE2C6C7BE21E}" type="datetimeFigureOut">
               <a:rPr lang="es-AR" smtClean="0"/>
-              <a:t>28/08/2013</a:t>
+              <a:t>29/08/2013</a:t>
             </a:fld>
             <a:endParaRPr lang="es-AR"/>
           </a:p>
@@ -2363,7 +2593,7 @@
           <a:p>
             <a:fld id="{7DF3FB16-FEC0-49EF-85A3-AE2C6C7BE21E}" type="datetimeFigureOut">
               <a:rPr lang="es-AR" smtClean="0"/>
-              <a:t>28/08/2013</a:t>
+              <a:t>29/08/2013</a:t>
             </a:fld>
             <a:endParaRPr lang="es-AR"/>
           </a:p>
@@ -2543,7 +2773,7 @@
           <a:p>
             <a:fld id="{7DF3FB16-FEC0-49EF-85A3-AE2C6C7BE21E}" type="datetimeFigureOut">
               <a:rPr lang="es-AR" smtClean="0"/>
-              <a:t>28/08/2013</a:t>
+              <a:t>29/08/2013</a:t>
             </a:fld>
             <a:endParaRPr lang="es-AR"/>
           </a:p>
@@ -2873,6 +3103,238 @@
 </p:sldLayout>
 </file>
 
+<file path=ppt/slideLayouts/slideLayout15.xml><?xml version="1.0" encoding="utf-8"?>
+<p:sldLayout xmlns:a="http://schemas.openxmlformats.org/drawingml/2006/main" xmlns:r="http://schemas.openxmlformats.org/officeDocument/2006/relationships" xmlns:p="http://schemas.openxmlformats.org/presentationml/2006/main" userDrawn="1">
+  <p:cSld name="1_Title and Content">
+    <p:spTree>
+      <p:nvGrpSpPr>
+        <p:cNvPr id="1" name=""/>
+        <p:cNvGrpSpPr/>
+        <p:nvPr/>
+      </p:nvGrpSpPr>
+      <p:grpSpPr>
+        <a:xfrm>
+          <a:off x="0" y="0"/>
+          <a:ext cx="0" cy="0"/>
+          <a:chOff x="0" y="0"/>
+          <a:chExt cx="0" cy="0"/>
+        </a:xfrm>
+      </p:grpSpPr>
+      <p:sp>
+        <p:nvSpPr>
+          <p:cNvPr id="2" name="Title 1"/>
+          <p:cNvSpPr>
+            <a:spLocks noGrp="1"/>
+          </p:cNvSpPr>
+          <p:nvPr>
+            <p:ph type="title"/>
+          </p:nvPr>
+        </p:nvSpPr>
+        <p:spPr>
+          <a:xfrm>
+            <a:off x="519249" y="228601"/>
+            <a:ext cx="11151917" cy="747897"/>
+          </a:xfrm>
+        </p:spPr>
+        <p:txBody>
+          <a:bodyPr/>
+          <a:lstStyle>
+            <a:lvl1pPr>
+              <a:defRPr sz="5399"/>
+            </a:lvl1pPr>
+          </a:lstStyle>
+          <a:p>
+            <a:r>
+              <a:rPr lang="en-US" smtClean="0"/>
+              <a:t>Click to edit Master title style</a:t>
+            </a:r>
+            <a:endParaRPr lang="en-US" dirty="0"/>
+          </a:p>
+        </p:txBody>
+      </p:sp>
+      <p:sp>
+        <p:nvSpPr>
+          <p:cNvPr id="5" name="Text Placeholder 4"/>
+          <p:cNvSpPr>
+            <a:spLocks noGrp="1"/>
+          </p:cNvSpPr>
+          <p:nvPr>
+            <p:ph type="body" sz="quarter" idx="10"/>
+          </p:nvPr>
+        </p:nvSpPr>
+        <p:spPr>
+          <a:xfrm>
+            <a:off x="519249" y="1447801"/>
+            <a:ext cx="11151917" cy="1038746"/>
+          </a:xfrm>
+        </p:spPr>
+        <p:txBody>
+          <a:bodyPr/>
+          <a:lstStyle>
+            <a:lvl1pPr marL="3174" indent="0">
+              <a:spcBef>
+                <a:spcPts val="0"/>
+              </a:spcBef>
+              <a:spcAft>
+                <a:spcPts val="900"/>
+              </a:spcAft>
+              <a:buSzPct val="80000"/>
+              <a:buFont typeface="Arial" pitchFamily="34" charset="0"/>
+              <a:buNone/>
+              <a:defRPr sz="4000" spc="-100" baseline="0">
+                <a:gradFill>
+                  <a:gsLst>
+                    <a:gs pos="0">
+                      <a:srgbClr val="595959"/>
+                    </a:gs>
+                    <a:gs pos="86000">
+                      <a:srgbClr val="595959"/>
+                    </a:gs>
+                  </a:gsLst>
+                  <a:lin ang="5400000" scaled="0"/>
+                </a:gradFill>
+                <a:latin typeface="Segoe UI Light" pitchFamily="34" charset="0"/>
+              </a:defRPr>
+            </a:lvl1pPr>
+            <a:lvl2pPr marL="3174" indent="0">
+              <a:spcBef>
+                <a:spcPts val="0"/>
+              </a:spcBef>
+              <a:buSzPct val="80000"/>
+              <a:buFont typeface="Arial" pitchFamily="34" charset="0"/>
+              <a:buNone/>
+              <a:defRPr sz="2000" spc="-50" baseline="0">
+                <a:gradFill>
+                  <a:gsLst>
+                    <a:gs pos="0">
+                      <a:srgbClr val="595959"/>
+                    </a:gs>
+                    <a:gs pos="86000">
+                      <a:srgbClr val="595959"/>
+                    </a:gs>
+                  </a:gsLst>
+                  <a:lin ang="5400000" scaled="0"/>
+                </a:gradFill>
+              </a:defRPr>
+            </a:lvl2pPr>
+            <a:lvl3pPr marL="1258646" indent="-403147">
+              <a:buSzPct val="80000"/>
+              <a:buFontTx/>
+              <a:buBlip>
+                <a:blip r:embed="rId2"/>
+              </a:buBlip>
+              <a:defRPr>
+                <a:gradFill>
+                  <a:gsLst>
+                    <a:gs pos="0">
+                      <a:schemeClr val="tx1">
+                        <a:lumMod val="90000"/>
+                        <a:lumOff val="10000"/>
+                      </a:schemeClr>
+                    </a:gs>
+                    <a:gs pos="86000">
+                      <a:schemeClr val="tx1">
+                        <a:lumMod val="90000"/>
+                        <a:lumOff val="10000"/>
+                      </a:schemeClr>
+                    </a:gs>
+                  </a:gsLst>
+                  <a:lin ang="5400000" scaled="0"/>
+                </a:gradFill>
+              </a:defRPr>
+            </a:lvl3pPr>
+            <a:lvl4pPr marL="1604655" indent="-346009">
+              <a:buSzPct val="80000"/>
+              <a:buFontTx/>
+              <a:buBlip>
+                <a:blip r:embed="rId2"/>
+              </a:buBlip>
+              <a:defRPr>
+                <a:gradFill>
+                  <a:gsLst>
+                    <a:gs pos="0">
+                      <a:schemeClr val="tx1">
+                        <a:lumMod val="90000"/>
+                        <a:lumOff val="10000"/>
+                      </a:schemeClr>
+                    </a:gs>
+                    <a:gs pos="86000">
+                      <a:schemeClr val="tx1">
+                        <a:lumMod val="90000"/>
+                        <a:lumOff val="10000"/>
+                      </a:schemeClr>
+                    </a:gs>
+                  </a:gsLst>
+                  <a:lin ang="5400000" scaled="0"/>
+                </a:gradFill>
+              </a:defRPr>
+            </a:lvl4pPr>
+            <a:lvl5pPr marL="1941140" indent="-336485">
+              <a:buSzPct val="80000"/>
+              <a:buFontTx/>
+              <a:buBlip>
+                <a:blip r:embed="rId2"/>
+              </a:buBlip>
+              <a:defRPr>
+                <a:gradFill>
+                  <a:gsLst>
+                    <a:gs pos="0">
+                      <a:schemeClr val="tx1">
+                        <a:lumMod val="90000"/>
+                        <a:lumOff val="10000"/>
+                      </a:schemeClr>
+                    </a:gs>
+                    <a:gs pos="86000">
+                      <a:schemeClr val="tx1">
+                        <a:lumMod val="90000"/>
+                        <a:lumOff val="10000"/>
+                      </a:schemeClr>
+                    </a:gs>
+                  </a:gsLst>
+                  <a:lin ang="5400000" scaled="0"/>
+                </a:gradFill>
+              </a:defRPr>
+            </a:lvl5pPr>
+          </a:lstStyle>
+          <a:p>
+            <a:pPr lvl="0"/>
+            <a:r>
+              <a:rPr lang="en-US" smtClean="0"/>
+              <a:t>Click to edit Master text styles</a:t>
+            </a:r>
+          </a:p>
+          <a:p>
+            <a:pPr lvl="1"/>
+            <a:r>
+              <a:rPr lang="en-US" smtClean="0"/>
+              <a:t>Second level</a:t>
+            </a:r>
+          </a:p>
+        </p:txBody>
+      </p:sp>
+    </p:spTree>
+    <p:extLst>
+      <p:ext uri="{BB962C8B-B14F-4D97-AF65-F5344CB8AC3E}">
+        <p14:creationId xmlns:p14="http://schemas.microsoft.com/office/powerpoint/2010/main" val="3376673318"/>
+      </p:ext>
+    </p:extLst>
+  </p:cSld>
+  <p:clrMapOvr>
+    <a:masterClrMapping/>
+  </p:clrMapOvr>
+  <p:transition>
+    <p:fade/>
+  </p:transition>
+  <p:timing>
+    <p:tnLst>
+      <p:par>
+        <p:cTn id="1" dur="indefinite" restart="never" nodeType="tmRoot"/>
+      </p:par>
+    </p:tnLst>
+  </p:timing>
+</p:sldLayout>
+</file>
+
 <file path=ppt/slideLayouts/slideLayout2.xml><?xml version="1.0" encoding="utf-8"?>
 <p:sldLayout xmlns:a="http://schemas.openxmlformats.org/drawingml/2006/main" xmlns:r="http://schemas.openxmlformats.org/officeDocument/2006/relationships" xmlns:p="http://schemas.openxmlformats.org/presentationml/2006/main" type="obj" preserve="1">
   <p:cSld name="Title and Content">
@@ -2982,7 +3444,7 @@
           <a:p>
             <a:fld id="{7DF3FB16-FEC0-49EF-85A3-AE2C6C7BE21E}" type="datetimeFigureOut">
               <a:rPr lang="es-AR" smtClean="0"/>
-              <a:t>28/08/2013</a:t>
+              <a:t>29/08/2013</a:t>
             </a:fld>
             <a:endParaRPr lang="es-AR"/>
           </a:p>
@@ -3228,7 +3690,7 @@
           <a:p>
             <a:fld id="{7DF3FB16-FEC0-49EF-85A3-AE2C6C7BE21E}" type="datetimeFigureOut">
               <a:rPr lang="es-AR" smtClean="0"/>
-              <a:t>28/08/2013</a:t>
+              <a:t>29/08/2013</a:t>
             </a:fld>
             <a:endParaRPr lang="es-AR"/>
           </a:p>
@@ -3516,7 +3978,7 @@
           <a:p>
             <a:fld id="{7DF3FB16-FEC0-49EF-85A3-AE2C6C7BE21E}" type="datetimeFigureOut">
               <a:rPr lang="es-AR" smtClean="0"/>
-              <a:t>28/08/2013</a:t>
+              <a:t>29/08/2013</a:t>
             </a:fld>
             <a:endParaRPr lang="es-AR"/>
           </a:p>
@@ -3938,7 +4400,7 @@
           <a:p>
             <a:fld id="{7DF3FB16-FEC0-49EF-85A3-AE2C6C7BE21E}" type="datetimeFigureOut">
               <a:rPr lang="es-AR" smtClean="0"/>
-              <a:t>28/08/2013</a:t>
+              <a:t>29/08/2013</a:t>
             </a:fld>
             <a:endParaRPr lang="es-AR"/>
           </a:p>
@@ -4056,7 +4518,7 @@
           <a:p>
             <a:fld id="{7DF3FB16-FEC0-49EF-85A3-AE2C6C7BE21E}" type="datetimeFigureOut">
               <a:rPr lang="es-AR" smtClean="0"/>
-              <a:t>28/08/2013</a:t>
+              <a:t>29/08/2013</a:t>
             </a:fld>
             <a:endParaRPr lang="es-AR"/>
           </a:p>
@@ -4151,7 +4613,7 @@
           <a:p>
             <a:fld id="{7DF3FB16-FEC0-49EF-85A3-AE2C6C7BE21E}" type="datetimeFigureOut">
               <a:rPr lang="es-AR" smtClean="0"/>
-              <a:t>28/08/2013</a:t>
+              <a:t>29/08/2013</a:t>
             </a:fld>
             <a:endParaRPr lang="es-AR"/>
           </a:p>
@@ -4428,7 +4890,7 @@
           <a:p>
             <a:fld id="{7DF3FB16-FEC0-49EF-85A3-AE2C6C7BE21E}" type="datetimeFigureOut">
               <a:rPr lang="es-AR" smtClean="0"/>
-              <a:t>28/08/2013</a:t>
+              <a:t>29/08/2013</a:t>
             </a:fld>
             <a:endParaRPr lang="es-AR"/>
           </a:p>
@@ -4681,7 +5143,7 @@
           <a:p>
             <a:fld id="{7DF3FB16-FEC0-49EF-85A3-AE2C6C7BE21E}" type="datetimeFigureOut">
               <a:rPr lang="es-AR" smtClean="0"/>
-              <a:t>28/08/2013</a:t>
+              <a:t>29/08/2013</a:t>
             </a:fld>
             <a:endParaRPr lang="es-AR"/>
           </a:p>
@@ -4898,7 +5360,7 @@
             <a:fld id="{7DF3FB16-FEC0-49EF-85A3-AE2C6C7BE21E}" type="datetimeFigureOut">
               <a:rPr lang="es-AR" smtClean="0"/>
               <a:pPr/>
-              <a:t>28/08/2013</a:t>
+              <a:t>29/08/2013</a:t>
             </a:fld>
             <a:endParaRPr lang="es-AR"/>
           </a:p>
@@ -5012,6 +5474,7 @@
     <p:sldLayoutId id="2147483660" r:id="rId12"/>
     <p:sldLayoutId id="2147483661" r:id="rId13"/>
     <p:sldLayoutId id="2147483662" r:id="rId14"/>
+    <p:sldLayoutId id="2147483663" r:id="rId15"/>
   </p:sldLayoutIdLst>
   <p:txStyles>
     <p:titleStyle>
@@ -5671,21 +6134,8 @@
                   <a:schemeClr val="tx1"/>
                 </a:solidFill>
               </a:rPr>
-              <a:t>Ezequiel </a:t>
+              <a:t>Ezequiel Jadib</a:t>
             </a:r>
-            <a:r>
-              <a:rPr lang="en-US" sz="2800" dirty="0">
-                <a:solidFill>
-                  <a:schemeClr val="tx1"/>
-                </a:solidFill>
-              </a:rPr>
-              <a:t>Jadib</a:t>
-            </a:r>
-            <a:endParaRPr lang="en-US" sz="2800" dirty="0">
-              <a:solidFill>
-                <a:schemeClr val="tx1"/>
-              </a:solidFill>
-            </a:endParaRPr>
           </a:p>
           <a:p>
             <a:pPr algn="l">
@@ -5699,15 +6149,7 @@
                   <a:schemeClr val="tx1"/>
                 </a:solidFill>
               </a:rPr>
-              <a:t> </a:t>
-            </a:r>
-            <a:r>
-              <a:rPr lang="en-US" sz="2800" i="1" dirty="0">
-                <a:solidFill>
-                  <a:schemeClr val="tx1"/>
-                </a:solidFill>
-              </a:rPr>
-              <a:t>   </a:t>
+              <a:t>    </a:t>
             </a:r>
             <a:r>
               <a:rPr lang="en-US" sz="2000" dirty="0">
@@ -5847,11 +6289,11 @@
   <p:clrMapOvr>
     <a:masterClrMapping/>
   </p:clrMapOvr>
-  <mc:AlternateContent xmlns:mc="http://schemas.openxmlformats.org/markup-compatibility/2006">
-    <mc:Choice xmlns:p14="http://schemas.microsoft.com/office/powerpoint/2010/main" Requires="p14">
+  <mc:AlternateContent xmlns:mc="http://schemas.openxmlformats.org/markup-compatibility/2006" xmlns:p14="http://schemas.microsoft.com/office/powerpoint/2010/main">
+    <mc:Choice Requires="p14">
       <p:transition p14:dur="0"/>
     </mc:Choice>
-    <mc:Fallback>
+    <mc:Fallback xmlns="">
       <p:transition/>
     </mc:Fallback>
   </mc:AlternateContent>
@@ -5903,7 +6345,7 @@
           <a:graphicData uri="http://schemas.openxmlformats.org/presentationml/2006/ole">
             <mc:AlternateContent xmlns:mc="http://schemas.openxmlformats.org/markup-compatibility/2006">
               <mc:Choice xmlns:v="urn:schemas-microsoft-com:vml" Requires="v">
-                <p:oleObj spid="_x0000_s2189" name="think-cell Slide" r:id="rId9" imgW="360" imgH="360" progId="">
+                <p:oleObj spid="_x0000_s2204" name="think-cell Slide" r:id="rId9" imgW="360" imgH="360" progId="">
                   <p:embed/>
                 </p:oleObj>
               </mc:Choice>
@@ -8390,25 +8832,7 @@
                 </a:solidFill>
                 <a:latin typeface="+mj-lt"/>
               </a:rPr>
-              <a:t>Empaqueta Smooth Streaming</a:t>
-            </a:r>
-            <a:r>
-              <a:rPr lang="es-AR" sz="1500" b="1" dirty="0">
-                <a:solidFill>
-                  <a:schemeClr val="bg1"/>
-                </a:solidFill>
-                <a:latin typeface="+mj-lt"/>
-              </a:rPr>
-              <a:t>, </a:t>
-            </a:r>
-            <a:r>
-              <a:rPr lang="es-AR" sz="1500" b="1" dirty="0">
-                <a:solidFill>
-                  <a:schemeClr val="bg1"/>
-                </a:solidFill>
-                <a:latin typeface="+mj-lt"/>
-              </a:rPr>
-              <a:t>HLS, MPEG-DASH, HDS </a:t>
+              <a:t>Empaqueta Smooth Streaming, HLS, MPEG-DASH, HDS </a:t>
             </a:r>
             <a:r>
               <a:rPr lang="es-AR" sz="1500" b="1" dirty="0" smtClean="0">
@@ -10452,11 +10876,11 @@
   <p:clrMapOvr>
     <a:masterClrMapping/>
   </p:clrMapOvr>
-  <mc:AlternateContent xmlns:mc="http://schemas.openxmlformats.org/markup-compatibility/2006">
-    <mc:Choice xmlns:p14="http://schemas.microsoft.com/office/powerpoint/2010/main" Requires="p14">
+  <mc:AlternateContent xmlns:mc="http://schemas.openxmlformats.org/markup-compatibility/2006" xmlns:p14="http://schemas.microsoft.com/office/powerpoint/2010/main">
+    <mc:Choice Requires="p14">
       <p:transition p14:dur="0"/>
     </mc:Choice>
-    <mc:Fallback>
+    <mc:Fallback xmlns="">
       <p:transition/>
     </mc:Fallback>
   </mc:AlternateContent>
@@ -10696,7 +11120,7 @@
           <a:graphicData uri="http://schemas.openxmlformats.org/presentationml/2006/ole">
             <mc:AlternateContent xmlns:mc="http://schemas.openxmlformats.org/markup-compatibility/2006">
               <mc:Choice xmlns:v="urn:schemas-microsoft-com:vml" Requires="v">
-                <p:oleObj spid="_x0000_s3212" name="think-cell Slide" r:id="rId8" imgW="360" imgH="360" progId="">
+                <p:oleObj spid="_x0000_s3227" name="think-cell Slide" r:id="rId8" imgW="360" imgH="360" progId="">
                   <p:embed/>
                 </p:oleObj>
               </mc:Choice>
@@ -14304,11 +14728,11 @@
   <p:clrMapOvr>
     <a:masterClrMapping/>
   </p:clrMapOvr>
-  <mc:AlternateContent xmlns:mc="http://schemas.openxmlformats.org/markup-compatibility/2006">
-    <mc:Choice xmlns:p14="http://schemas.microsoft.com/office/powerpoint/2010/main" Requires="p14">
+  <mc:AlternateContent xmlns:mc="http://schemas.openxmlformats.org/markup-compatibility/2006" xmlns:p14="http://schemas.microsoft.com/office/powerpoint/2010/main">
+    <mc:Choice Requires="p14">
       <p:transition p14:dur="0"/>
     </mc:Choice>
-    <mc:Fallback>
+    <mc:Fallback xmlns="">
       <p:transition/>
     </mc:Fallback>
   </mc:AlternateContent>
@@ -14548,7 +14972,7 @@
           <a:graphicData uri="http://schemas.openxmlformats.org/presentationml/2006/ole">
             <mc:AlternateContent xmlns:mc="http://schemas.openxmlformats.org/markup-compatibility/2006">
               <mc:Choice xmlns:v="urn:schemas-microsoft-com:vml" Requires="v">
-                <p:oleObj spid="_x0000_s4235" name="think-cell Slide" r:id="rId11" imgW="360" imgH="360" progId="">
+                <p:oleObj spid="_x0000_s4250" name="think-cell Slide" r:id="rId11" imgW="360" imgH="360" progId="">
                   <p:embed/>
                 </p:oleObj>
               </mc:Choice>
@@ -17577,16 +18001,7 @@
                 </a:solidFill>
                 <a:latin typeface="+mj-lt"/>
               </a:rPr>
-              <a:t>Ancho de banda garantizado. Recuperación / redundancia automática. </a:t>
-            </a:r>
-            <a:r>
-              <a:rPr lang="es-AR" sz="1500" b="1" spc="-75" dirty="0">
-                <a:solidFill>
-                  <a:schemeClr val="bg1"/>
-                </a:solidFill>
-                <a:latin typeface="+mj-lt"/>
-              </a:rPr>
-              <a:t>Alta disponibilidad</a:t>
+              <a:t>Ancho de banda garantizado. Recuperación / redundancia automática. Alta disponibilidad</a:t>
             </a:r>
           </a:p>
           <a:p>
@@ -18649,11 +19064,11 @@
   <p:clrMapOvr>
     <a:masterClrMapping/>
   </p:clrMapOvr>
-  <mc:AlternateContent xmlns:mc="http://schemas.openxmlformats.org/markup-compatibility/2006">
-    <mc:Choice xmlns:p14="http://schemas.microsoft.com/office/powerpoint/2010/main" Requires="p14">
+  <mc:AlternateContent xmlns:mc="http://schemas.openxmlformats.org/markup-compatibility/2006" xmlns:p14="http://schemas.microsoft.com/office/powerpoint/2010/main">
+    <mc:Choice Requires="p14">
       <p:transition p14:dur="0"/>
     </mc:Choice>
-    <mc:Fallback>
+    <mc:Fallback xmlns="">
       <p:transition/>
     </mc:Fallback>
   </mc:AlternateContent>
@@ -19136,11 +19551,11 @@
   <p:clrMapOvr>
     <a:masterClrMapping/>
   </p:clrMapOvr>
-  <mc:AlternateContent xmlns:mc="http://schemas.openxmlformats.org/markup-compatibility/2006">
-    <mc:Choice xmlns:p14="http://schemas.microsoft.com/office/powerpoint/2010/main" Requires="p14">
+  <mc:AlternateContent xmlns:mc="http://schemas.openxmlformats.org/markup-compatibility/2006" xmlns:p14="http://schemas.microsoft.com/office/powerpoint/2010/main">
+    <mc:Choice Requires="p14">
       <p:transition p14:dur="0"/>
     </mc:Choice>
-    <mc:Fallback>
+    <mc:Fallback xmlns="">
       <p:transition/>
     </mc:Fallback>
   </mc:AlternateContent>
@@ -19254,11 +19669,6 @@
               </a:rPr>
               <a:t>Media Services</a:t>
             </a:r>
-            <a:endParaRPr lang="en-US" sz="4400" dirty="0">
-              <a:solidFill>
-                <a:schemeClr val="bg1"/>
-              </a:solidFill>
-            </a:endParaRPr>
           </a:p>
         </p:txBody>
       </p:sp>
@@ -19272,11 +19682,11 @@
   <p:clrMapOvr>
     <a:masterClrMapping/>
   </p:clrMapOvr>
-  <mc:AlternateContent xmlns:mc="http://schemas.openxmlformats.org/markup-compatibility/2006">
-    <mc:Choice xmlns:p14="http://schemas.microsoft.com/office/powerpoint/2010/main" Requires="p14">
+  <mc:AlternateContent xmlns:mc="http://schemas.openxmlformats.org/markup-compatibility/2006" xmlns:p14="http://schemas.microsoft.com/office/powerpoint/2010/main">
+    <mc:Choice Requires="p14">
       <p:transition p14:dur="0"/>
     </mc:Choice>
-    <mc:Fallback>
+    <mc:Fallback xmlns="">
       <p:transition/>
     </mc:Fallback>
   </mc:AlternateContent>
@@ -19960,11 +20370,11 @@
   <p:clrMapOvr>
     <a:masterClrMapping/>
   </p:clrMapOvr>
-  <mc:AlternateContent xmlns:mc="http://schemas.openxmlformats.org/markup-compatibility/2006">
-    <mc:Choice xmlns:p14="http://schemas.microsoft.com/office/powerpoint/2010/main" Requires="p14">
+  <mc:AlternateContent xmlns:mc="http://schemas.openxmlformats.org/markup-compatibility/2006" xmlns:p14="http://schemas.microsoft.com/office/powerpoint/2010/main">
+    <mc:Choice Requires="p14">
       <p:transition p14:dur="0"/>
     </mc:Choice>
-    <mc:Fallback>
+    <mc:Fallback xmlns="">
       <p:transition/>
     </mc:Fallback>
   </mc:AlternateContent>
@@ -20027,15 +20437,7 @@
                   <a:schemeClr val="bg1"/>
                 </a:solidFill>
               </a:rPr>
-              <a:t>Demo: Windows Azure Media Services </a:t>
-            </a:r>
-            <a:r>
-              <a:rPr lang="en-US" dirty="0" smtClean="0">
-                <a:solidFill>
-                  <a:schemeClr val="bg1"/>
-                </a:solidFill>
-              </a:rPr>
-              <a:t>workflow con .NET SDK</a:t>
+              <a:t>Demo: Windows Azure Media Services workflow con .NET SDK</a:t>
             </a:r>
             <a:endParaRPr lang="en-US" dirty="0">
               <a:solidFill>
@@ -20821,11 +21223,11 @@
   <p:clrMapOvr>
     <a:masterClrMapping/>
   </p:clrMapOvr>
-  <mc:AlternateContent xmlns:mc="http://schemas.openxmlformats.org/markup-compatibility/2006">
-    <mc:Choice xmlns:p14="http://schemas.microsoft.com/office/powerpoint/2010/main" Requires="p14">
+  <mc:AlternateContent xmlns:mc="http://schemas.openxmlformats.org/markup-compatibility/2006" xmlns:p14="http://schemas.microsoft.com/office/powerpoint/2010/main">
+    <mc:Choice Requires="p14">
       <p:transition p14:dur="0"/>
     </mc:Choice>
-    <mc:Fallback>
+    <mc:Fallback xmlns="">
       <p:transition/>
     </mc:Fallback>
   </mc:AlternateContent>
@@ -21184,14 +21586,6 @@
               </a:rPr>
               <a:t>Multi-bitrates Mp4</a:t>
             </a:r>
-            <a:endParaRPr lang="en-US" sz="1568" b="1" dirty="0">
-              <a:solidFill>
-                <a:schemeClr val="tx1">
-                  <a:lumMod val="65000"/>
-                  <a:lumOff val="35000"/>
-                </a:schemeClr>
-              </a:solidFill>
-            </a:endParaRPr>
           </a:p>
         </p:txBody>
       </p:sp>
@@ -21228,14 +21622,6 @@
               </a:rPr>
               <a:t>Origin Server</a:t>
             </a:r>
-            <a:endParaRPr lang="en-US" sz="1568" b="1" dirty="0">
-              <a:solidFill>
-                <a:schemeClr val="tx1">
-                  <a:lumMod val="65000"/>
-                  <a:lumOff val="35000"/>
-                </a:schemeClr>
-              </a:solidFill>
-            </a:endParaRPr>
           </a:p>
         </p:txBody>
       </p:sp>
@@ -21332,14 +21718,6 @@
               </a:rPr>
               <a:t>HLS</a:t>
             </a:r>
-            <a:endParaRPr lang="en-US" sz="1078" b="1" dirty="0">
-              <a:solidFill>
-                <a:schemeClr val="tx1">
-                  <a:lumMod val="65000"/>
-                  <a:lumOff val="35000"/>
-                </a:schemeClr>
-              </a:solidFill>
-            </a:endParaRPr>
           </a:p>
         </p:txBody>
       </p:sp>
@@ -21389,14 +21767,6 @@
               </a:rPr>
               <a:t>Streaming</a:t>
             </a:r>
-            <a:endParaRPr lang="en-US" sz="1029" b="1" dirty="0">
-              <a:solidFill>
-                <a:schemeClr val="tx1">
-                  <a:lumMod val="65000"/>
-                  <a:lumOff val="35000"/>
-                </a:schemeClr>
-              </a:solidFill>
-            </a:endParaRPr>
           </a:p>
         </p:txBody>
       </p:sp>
@@ -21635,14 +22005,6 @@
               </a:rPr>
               <a:t>Multi-bitrates Mp4</a:t>
             </a:r>
-            <a:endParaRPr lang="en-US" sz="1568" b="1" dirty="0">
-              <a:solidFill>
-                <a:schemeClr val="tx1">
-                  <a:lumMod val="65000"/>
-                  <a:lumOff val="35000"/>
-                </a:schemeClr>
-              </a:solidFill>
-            </a:endParaRPr>
           </a:p>
         </p:txBody>
       </p:sp>
@@ -21704,15 +22066,6 @@
               </a:rPr>
               <a:t>Origin Server</a:t>
             </a:r>
-            <a:endParaRPr lang="en-US" sz="1568" b="1" dirty="0">
-              <a:solidFill>
-                <a:schemeClr val="tx1">
-                  <a:lumMod val="65000"/>
-                  <a:lumOff val="35000"/>
-                </a:schemeClr>
-              </a:solidFill>
-              <a:latin typeface="+mj-lt"/>
-            </a:endParaRPr>
           </a:p>
         </p:txBody>
       </p:sp>
@@ -21809,14 +22162,6 @@
               </a:rPr>
               <a:t>HLS</a:t>
             </a:r>
-            <a:endParaRPr lang="en-US" sz="1078" b="1" dirty="0">
-              <a:solidFill>
-                <a:schemeClr val="tx1">
-                  <a:lumMod val="65000"/>
-                  <a:lumOff val="35000"/>
-                </a:schemeClr>
-              </a:solidFill>
-            </a:endParaRPr>
           </a:p>
         </p:txBody>
       </p:sp>
@@ -21866,14 +22211,6 @@
               </a:rPr>
               <a:t>Streaming</a:t>
             </a:r>
-            <a:endParaRPr lang="en-US" sz="1029" b="1" dirty="0">
-              <a:solidFill>
-                <a:schemeClr val="tx1">
-                  <a:lumMod val="65000"/>
-                  <a:lumOff val="35000"/>
-                </a:schemeClr>
-              </a:solidFill>
-            </a:endParaRPr>
           </a:p>
         </p:txBody>
       </p:sp>
@@ -22050,15 +22387,7 @@
             </a:r>
             <a:r>
               <a:rPr lang="es-AR" sz="1568" dirty="0" smtClean="0"/>
-              <a:t> – </a:t>
-            </a:r>
-            <a:r>
-              <a:rPr lang="es-AR" sz="1568" dirty="0" err="1" smtClean="0"/>
-              <a:t>Workflow</a:t>
-            </a:r>
-            <a:r>
-              <a:rPr lang="es-AR" sz="1568" dirty="0" smtClean="0"/>
-              <a:t> tradicional</a:t>
+              <a:t> – Workflow tradicional</a:t>
             </a:r>
             <a:endParaRPr lang="es-AR" sz="1568" dirty="0"/>
           </a:p>
@@ -23309,11 +23638,11 @@
   <p:clrMapOvr>
     <a:masterClrMapping/>
   </p:clrMapOvr>
-  <mc:AlternateContent xmlns:mc="http://schemas.openxmlformats.org/markup-compatibility/2006">
-    <mc:Choice xmlns:p14="http://schemas.microsoft.com/office/powerpoint/2010/main" Requires="p14">
+  <mc:AlternateContent xmlns:mc="http://schemas.openxmlformats.org/markup-compatibility/2006" xmlns:p14="http://schemas.microsoft.com/office/powerpoint/2010/main">
+    <mc:Choice Requires="p14">
       <p:transition p14:dur="0"/>
     </mc:Choice>
-    <mc:Fallback>
+    <mc:Fallback xmlns="">
       <p:transition/>
     </mc:Fallback>
   </mc:AlternateContent>
@@ -26259,11 +26588,11 @@
   <p:clrMapOvr>
     <a:masterClrMapping/>
   </p:clrMapOvr>
-  <mc:AlternateContent xmlns:mc="http://schemas.openxmlformats.org/markup-compatibility/2006">
-    <mc:Choice xmlns:p14="http://schemas.microsoft.com/office/powerpoint/2010/main" Requires="p14">
+  <mc:AlternateContent xmlns:mc="http://schemas.openxmlformats.org/markup-compatibility/2006" xmlns:p14="http://schemas.microsoft.com/office/powerpoint/2010/main">
+    <mc:Choice Requires="p14">
       <p:transition p14:dur="10"/>
     </mc:Choice>
-    <mc:Fallback>
+    <mc:Fallback xmlns="">
       <p:transition/>
     </mc:Fallback>
   </mc:AlternateContent>
@@ -26795,11 +27124,11 @@
   <p:clrMapOvr>
     <a:masterClrMapping/>
   </p:clrMapOvr>
-  <mc:AlternateContent xmlns:mc="http://schemas.openxmlformats.org/markup-compatibility/2006">
-    <mc:Choice xmlns:p14="http://schemas.microsoft.com/office/powerpoint/2010/main" Requires="p14">
+  <mc:AlternateContent xmlns:mc="http://schemas.openxmlformats.org/markup-compatibility/2006" xmlns:p14="http://schemas.microsoft.com/office/powerpoint/2010/main">
+    <mc:Choice Requires="p14">
       <p:transition p14:dur="10"/>
     </mc:Choice>
-    <mc:Fallback>
+    <mc:Fallback xmlns="">
       <p:transition/>
     </mc:Fallback>
   </mc:AlternateContent>
@@ -26874,11 +27203,11 @@
   <p:clrMapOvr>
     <a:masterClrMapping/>
   </p:clrMapOvr>
-  <mc:AlternateContent xmlns:mc="http://schemas.openxmlformats.org/markup-compatibility/2006">
-    <mc:Choice xmlns:p14="http://schemas.microsoft.com/office/powerpoint/2010/main" Requires="p14">
+  <mc:AlternateContent xmlns:mc="http://schemas.openxmlformats.org/markup-compatibility/2006" xmlns:p14="http://schemas.microsoft.com/office/powerpoint/2010/main">
+    <mc:Choice Requires="p14">
       <p:transition p14:dur="0"/>
     </mc:Choice>
-    <mc:Fallback>
+    <mc:Fallback xmlns="">
       <p:transition/>
     </mc:Fallback>
   </mc:AlternateContent>
@@ -28004,120 +28333,6 @@
       </p:grpSp>
       <p:grpSp>
         <p:nvGrpSpPr>
-          <p:cNvPr id="21" name="Group 20"/>
-          <p:cNvGrpSpPr/>
-          <p:nvPr/>
-        </p:nvGrpSpPr>
-        <p:grpSpPr>
-          <a:xfrm>
-            <a:off x="477220" y="1763518"/>
-            <a:ext cx="10715673" cy="957854"/>
-            <a:chOff x="398388" y="2508874"/>
-            <a:chExt cx="7968080" cy="957854"/>
-          </a:xfrm>
-        </p:grpSpPr>
-        <p:pic>
-          <p:nvPicPr>
-            <p:cNvPr id="22" name="Picture 2" descr="\\w7-hmeydac\Share\WindowsPhone\light\appbar.control.play.png"/>
-            <p:cNvPicPr>
-              <a:picLocks noChangeAspect="1" noChangeArrowheads="1"/>
-            </p:cNvPicPr>
-            <p:nvPr/>
-          </p:nvPicPr>
-          <p:blipFill>
-            <a:blip r:embed="rId5">
-              <a:duotone>
-                <a:schemeClr val="accent4">
-                  <a:shade val="45000"/>
-                  <a:satMod val="135000"/>
-                </a:schemeClr>
-                <a:prstClr val="white"/>
-              </a:duotone>
-              <a:extLst>
-                <a:ext uri="{28A0092B-C50C-407E-A947-70E740481C1C}">
-                  <a14:useLocalDpi xmlns:a14="http://schemas.microsoft.com/office/drawing/2010/main" val="0"/>
-                </a:ext>
-              </a:extLst>
-            </a:blip>
-            <a:srcRect/>
-            <a:stretch>
-              <a:fillRect/>
-            </a:stretch>
-          </p:blipFill>
-          <p:spPr bwMode="auto">
-            <a:xfrm>
-              <a:off x="398388" y="2508874"/>
-              <a:ext cx="720000" cy="720000"/>
-            </a:xfrm>
-            <a:prstGeom prst="rect">
-              <a:avLst/>
-            </a:prstGeom>
-            <a:noFill/>
-            <a:extLst>
-              <a:ext uri="{909E8E84-426E-40DD-AFC4-6F175D3DCCD1}">
-                <a14:hiddenFill xmlns:a14="http://schemas.microsoft.com/office/drawing/2010/main">
-                  <a:solidFill>
-                    <a:srgbClr val="FFFFFF"/>
-                  </a:solidFill>
-                </a14:hiddenFill>
-              </a:ext>
-            </a:extLst>
-          </p:spPr>
-        </p:pic>
-        <p:sp>
-          <p:nvSpPr>
-            <p:cNvPr id="23" name="TextBox 22"/>
-            <p:cNvSpPr txBox="1"/>
-            <p:nvPr/>
-          </p:nvSpPr>
-          <p:spPr>
-            <a:xfrm>
-              <a:off x="1071817" y="2635731"/>
-              <a:ext cx="7294651" cy="830997"/>
-            </a:xfrm>
-            <a:prstGeom prst="rect">
-              <a:avLst/>
-            </a:prstGeom>
-            <a:noFill/>
-          </p:spPr>
-          <p:txBody>
-            <a:bodyPr wrap="square" rtlCol="0">
-              <a:spAutoFit/>
-            </a:bodyPr>
-            <a:lstStyle/>
-            <a:p>
-              <a:pPr marL="0" lvl="1">
-                <a:spcBef>
-                  <a:spcPts val="1200"/>
-                </a:spcBef>
-              </a:pPr>
-              <a:r>
-                <a:rPr lang="es-AR" sz="2400" dirty="0" smtClean="0">
-                  <a:latin typeface="Segoe UI" pitchFamily="34" charset="0"/>
-                  <a:cs typeface="Segoe UI" pitchFamily="34" charset="0"/>
-                </a:rPr>
-                <a:t>Construido en base a las capacidades del Smooth Streaming </a:t>
-              </a:r>
-              <a:r>
-                <a:rPr lang="es-AR" sz="2400" dirty="0" err="1" smtClean="0">
-                  <a:latin typeface="Segoe UI" pitchFamily="34" charset="0"/>
-                  <a:cs typeface="Segoe UI" pitchFamily="34" charset="0"/>
-                </a:rPr>
-                <a:t>Client</a:t>
-              </a:r>
-              <a:r>
-                <a:rPr lang="es-AR" sz="2400" dirty="0" smtClean="0">
-                  <a:latin typeface="Segoe UI" pitchFamily="34" charset="0"/>
-                  <a:cs typeface="Segoe UI" pitchFamily="34" charset="0"/>
-                </a:rPr>
-                <a:t> SDK</a:t>
-              </a:r>
-            </a:p>
-          </p:txBody>
-        </p:sp>
-      </p:grpSp>
-      <p:grpSp>
-        <p:nvGrpSpPr>
           <p:cNvPr id="24" name="Group 23"/>
           <p:cNvGrpSpPr/>
           <p:nvPr/>
@@ -28428,6 +28643,36 @@
           </p:txBody>
         </p:sp>
       </p:grpSp>
+      <p:pic>
+        <p:nvPicPr>
+          <p:cNvPr id="11" name="Picture 10"/>
+          <p:cNvPicPr>
+            <a:picLocks noChangeAspect="1"/>
+          </p:cNvPicPr>
+          <p:nvPr/>
+        </p:nvPicPr>
+        <p:blipFill>
+          <a:blip r:embed="rId7">
+            <a:extLst>
+              <a:ext uri="{28A0092B-C50C-407E-A947-70E740481C1C}">
+                <a14:useLocalDpi xmlns:a14="http://schemas.microsoft.com/office/drawing/2010/main" val="0"/>
+              </a:ext>
+            </a:extLst>
+          </a:blip>
+          <a:stretch>
+            <a:fillRect/>
+          </a:stretch>
+        </p:blipFill>
+        <p:spPr>
+          <a:xfrm>
+            <a:off x="504632" y="1763146"/>
+            <a:ext cx="10778662" cy="957155"/>
+          </a:xfrm>
+          <a:prstGeom prst="rect">
+            <a:avLst/>
+          </a:prstGeom>
+        </p:spPr>
+      </p:pic>
     </p:spTree>
     <p:custDataLst>
       <p:tags r:id="rId1"/>
@@ -28441,94 +28686,18 @@
   <p:clrMapOvr>
     <a:masterClrMapping/>
   </p:clrMapOvr>
-  <mc:AlternateContent xmlns:mc="http://schemas.openxmlformats.org/markup-compatibility/2006">
-    <mc:Choice xmlns:p14="http://schemas.microsoft.com/office/powerpoint/2010/main" Requires="p14">
+  <mc:AlternateContent xmlns:mc="http://schemas.openxmlformats.org/markup-compatibility/2006" xmlns:p14="http://schemas.microsoft.com/office/powerpoint/2010/main">
+    <mc:Choice Requires="p14">
       <p:transition p14:dur="0"/>
     </mc:Choice>
-    <mc:Fallback>
+    <mc:Fallback xmlns="">
       <p:transition/>
     </mc:Fallback>
   </mc:AlternateContent>
   <p:timing>
     <p:tnLst>
       <p:par>
-        <p:cTn id="1" dur="indefinite" restart="never" nodeType="tmRoot">
-          <p:childTnLst>
-            <p:seq concurrent="1" nextAc="seek">
-              <p:cTn id="2" dur="indefinite" nodeType="mainSeq">
-                <p:childTnLst>
-                  <p:par>
-                    <p:cTn id="3" fill="hold">
-                      <p:stCondLst>
-                        <p:cond delay="indefinite"/>
-                      </p:stCondLst>
-                      <p:childTnLst>
-                        <p:par>
-                          <p:cTn id="4" fill="hold">
-                            <p:stCondLst>
-                              <p:cond delay="0"/>
-                            </p:stCondLst>
-                            <p:childTnLst>
-                              <p:par>
-                                <p:cTn id="5" presetID="10" presetClass="entr" presetSubtype="0" fill="hold" nodeType="clickEffect">
-                                  <p:stCondLst>
-                                    <p:cond delay="0"/>
-                                  </p:stCondLst>
-                                  <p:childTnLst>
-                                    <p:set>
-                                      <p:cBhvr>
-                                        <p:cTn id="6" dur="1" fill="hold">
-                                          <p:stCondLst>
-                                            <p:cond delay="0"/>
-                                          </p:stCondLst>
-                                        </p:cTn>
-                                        <p:tgtEl>
-                                          <p:spTgt spid="3"/>
-                                        </p:tgtEl>
-                                        <p:attrNameLst>
-                                          <p:attrName>style.visibility</p:attrName>
-                                        </p:attrNameLst>
-                                      </p:cBhvr>
-                                      <p:to>
-                                        <p:strVal val="visible"/>
-                                      </p:to>
-                                    </p:set>
-                                    <p:animEffect transition="in" filter="fade">
-                                      <p:cBhvr>
-                                        <p:cTn id="7" dur="500"/>
-                                        <p:tgtEl>
-                                          <p:spTgt spid="3"/>
-                                        </p:tgtEl>
-                                      </p:cBhvr>
-                                    </p:animEffect>
-                                  </p:childTnLst>
-                                </p:cTn>
-                              </p:par>
-                            </p:childTnLst>
-                          </p:cTn>
-                        </p:par>
-                      </p:childTnLst>
-                    </p:cTn>
-                  </p:par>
-                </p:childTnLst>
-              </p:cTn>
-              <p:prevCondLst>
-                <p:cond evt="onPrev" delay="0">
-                  <p:tgtEl>
-                    <p:sldTgt/>
-                  </p:tgtEl>
-                </p:cond>
-              </p:prevCondLst>
-              <p:nextCondLst>
-                <p:cond evt="onNext" delay="0">
-                  <p:tgtEl>
-                    <p:sldTgt/>
-                  </p:tgtEl>
-                </p:cond>
-              </p:nextCondLst>
-            </p:seq>
-          </p:childTnLst>
-        </p:cTn>
+        <p:cTn id="1" dur="indefinite" restart="never" nodeType="tmRoot"/>
       </p:par>
     </p:tnLst>
   </p:timing>
@@ -30433,11 +30602,11 @@
   <p:clrMapOvr>
     <a:masterClrMapping/>
   </p:clrMapOvr>
-  <mc:AlternateContent xmlns:mc="http://schemas.openxmlformats.org/markup-compatibility/2006">
-    <mc:Choice xmlns:p14="http://schemas.microsoft.com/office/powerpoint/2010/main" Requires="p14">
+  <mc:AlternateContent xmlns:mc="http://schemas.openxmlformats.org/markup-compatibility/2006" xmlns:p14="http://schemas.microsoft.com/office/powerpoint/2010/main">
+    <mc:Choice Requires="p14">
       <p:transition p14:dur="0"/>
     </mc:Choice>
-    <mc:Fallback>
+    <mc:Fallback xmlns="">
       <p:transition/>
     </mc:Fallback>
   </mc:AlternateContent>
@@ -31240,11 +31409,11 @@
   <p:clrMapOvr>
     <a:masterClrMapping/>
   </p:clrMapOvr>
-  <mc:AlternateContent xmlns:mc="http://schemas.openxmlformats.org/markup-compatibility/2006">
-    <mc:Choice xmlns:p14="http://schemas.microsoft.com/office/powerpoint/2010/main" Requires="p14">
+  <mc:AlternateContent xmlns:mc="http://schemas.openxmlformats.org/markup-compatibility/2006" xmlns:p14="http://schemas.microsoft.com/office/powerpoint/2010/main">
+    <mc:Choice Requires="p14">
       <p:transition p14:dur="0"/>
     </mc:Choice>
-    <mc:Fallback>
+    <mc:Fallback xmlns="">
       <p:transition/>
     </mc:Fallback>
   </mc:AlternateContent>
@@ -31769,548 +31938,20 @@
   <p:clrMapOvr>
     <a:masterClrMapping/>
   </p:clrMapOvr>
-  <mc:AlternateContent xmlns:mc="http://schemas.openxmlformats.org/markup-compatibility/2006">
-    <mc:Choice xmlns:p14="http://schemas.microsoft.com/office/powerpoint/2010/main" Requires="p14">
+  <mc:AlternateContent xmlns:mc="http://schemas.openxmlformats.org/markup-compatibility/2006" xmlns:p14="http://schemas.microsoft.com/office/powerpoint/2010/main">
+    <mc:Choice Requires="p14">
       <p:transition p14:dur="0"/>
     </mc:Choice>
-    <mc:Fallback>
+    <mc:Fallback xmlns="">
       <p:transition/>
     </mc:Fallback>
   </mc:AlternateContent>
   <p:timing>
     <p:tnLst>
       <p:par>
-        <p:cTn id="1" dur="indefinite" restart="never" nodeType="tmRoot">
-          <p:childTnLst>
-            <p:seq concurrent="1" nextAc="seek">
-              <p:cTn id="2" dur="indefinite" nodeType="mainSeq">
-                <p:childTnLst>
-                  <p:par>
-                    <p:cTn id="3" fill="hold">
-                      <p:stCondLst>
-                        <p:cond delay="indefinite"/>
-                      </p:stCondLst>
-                      <p:childTnLst>
-                        <p:par>
-                          <p:cTn id="4" fill="hold">
-                            <p:stCondLst>
-                              <p:cond delay="0"/>
-                            </p:stCondLst>
-                            <p:childTnLst>
-                              <p:par>
-                                <p:cTn id="5" presetID="10" presetClass="entr" presetSubtype="0" fill="hold" grpId="0" nodeType="clickEffect">
-                                  <p:stCondLst>
-                                    <p:cond delay="0"/>
-                                  </p:stCondLst>
-                                  <p:childTnLst>
-                                    <p:set>
-                                      <p:cBhvr>
-                                        <p:cTn id="6" dur="1" fill="hold">
-                                          <p:stCondLst>
-                                            <p:cond delay="0"/>
-                                          </p:stCondLst>
-                                        </p:cTn>
-                                        <p:tgtEl>
-                                          <p:spTgt spid="3">
-                                            <p:txEl>
-                                              <p:pRg st="0" end="0"/>
-                                            </p:txEl>
-                                          </p:spTgt>
-                                        </p:tgtEl>
-                                        <p:attrNameLst>
-                                          <p:attrName>style.visibility</p:attrName>
-                                        </p:attrNameLst>
-                                      </p:cBhvr>
-                                      <p:to>
-                                        <p:strVal val="visible"/>
-                                      </p:to>
-                                    </p:set>
-                                    <p:animEffect transition="in" filter="fade">
-                                      <p:cBhvr>
-                                        <p:cTn id="7" dur="500"/>
-                                        <p:tgtEl>
-                                          <p:spTgt spid="3">
-                                            <p:txEl>
-                                              <p:pRg st="0" end="0"/>
-                                            </p:txEl>
-                                          </p:spTgt>
-                                        </p:tgtEl>
-                                      </p:cBhvr>
-                                    </p:animEffect>
-                                  </p:childTnLst>
-                                </p:cTn>
-                              </p:par>
-                            </p:childTnLst>
-                          </p:cTn>
-                        </p:par>
-                      </p:childTnLst>
-                    </p:cTn>
-                  </p:par>
-                  <p:par>
-                    <p:cTn id="8" fill="hold">
-                      <p:stCondLst>
-                        <p:cond delay="indefinite"/>
-                      </p:stCondLst>
-                      <p:childTnLst>
-                        <p:par>
-                          <p:cTn id="9" fill="hold">
-                            <p:stCondLst>
-                              <p:cond delay="0"/>
-                            </p:stCondLst>
-                            <p:childTnLst>
-                              <p:par>
-                                <p:cTn id="10" presetID="10" presetClass="entr" presetSubtype="0" fill="hold" grpId="0" nodeType="clickEffect">
-                                  <p:stCondLst>
-                                    <p:cond delay="0"/>
-                                  </p:stCondLst>
-                                  <p:childTnLst>
-                                    <p:set>
-                                      <p:cBhvr>
-                                        <p:cTn id="11" dur="1" fill="hold">
-                                          <p:stCondLst>
-                                            <p:cond delay="0"/>
-                                          </p:stCondLst>
-                                        </p:cTn>
-                                        <p:tgtEl>
-                                          <p:spTgt spid="3">
-                                            <p:txEl>
-                                              <p:pRg st="1" end="1"/>
-                                            </p:txEl>
-                                          </p:spTgt>
-                                        </p:tgtEl>
-                                        <p:attrNameLst>
-                                          <p:attrName>style.visibility</p:attrName>
-                                        </p:attrNameLst>
-                                      </p:cBhvr>
-                                      <p:to>
-                                        <p:strVal val="visible"/>
-                                      </p:to>
-                                    </p:set>
-                                    <p:animEffect transition="in" filter="fade">
-                                      <p:cBhvr>
-                                        <p:cTn id="12" dur="500"/>
-                                        <p:tgtEl>
-                                          <p:spTgt spid="3">
-                                            <p:txEl>
-                                              <p:pRg st="1" end="1"/>
-                                            </p:txEl>
-                                          </p:spTgt>
-                                        </p:tgtEl>
-                                      </p:cBhvr>
-                                    </p:animEffect>
-                                  </p:childTnLst>
-                                </p:cTn>
-                              </p:par>
-                              <p:par>
-                                <p:cTn id="13" presetID="10" presetClass="entr" presetSubtype="0" fill="hold" grpId="0" nodeType="withEffect">
-                                  <p:stCondLst>
-                                    <p:cond delay="0"/>
-                                  </p:stCondLst>
-                                  <p:childTnLst>
-                                    <p:set>
-                                      <p:cBhvr>
-                                        <p:cTn id="14" dur="1" fill="hold">
-                                          <p:stCondLst>
-                                            <p:cond delay="0"/>
-                                          </p:stCondLst>
-                                        </p:cTn>
-                                        <p:tgtEl>
-                                          <p:spTgt spid="3">
-                                            <p:txEl>
-                                              <p:pRg st="2" end="2"/>
-                                            </p:txEl>
-                                          </p:spTgt>
-                                        </p:tgtEl>
-                                        <p:attrNameLst>
-                                          <p:attrName>style.visibility</p:attrName>
-                                        </p:attrNameLst>
-                                      </p:cBhvr>
-                                      <p:to>
-                                        <p:strVal val="visible"/>
-                                      </p:to>
-                                    </p:set>
-                                    <p:animEffect transition="in" filter="fade">
-                                      <p:cBhvr>
-                                        <p:cTn id="15" dur="500"/>
-                                        <p:tgtEl>
-                                          <p:spTgt spid="3">
-                                            <p:txEl>
-                                              <p:pRg st="2" end="2"/>
-                                            </p:txEl>
-                                          </p:spTgt>
-                                        </p:tgtEl>
-                                      </p:cBhvr>
-                                    </p:animEffect>
-                                  </p:childTnLst>
-                                </p:cTn>
-                              </p:par>
-                              <p:par>
-                                <p:cTn id="16" presetID="10" presetClass="entr" presetSubtype="0" fill="hold" grpId="0" nodeType="withEffect">
-                                  <p:stCondLst>
-                                    <p:cond delay="0"/>
-                                  </p:stCondLst>
-                                  <p:childTnLst>
-                                    <p:set>
-                                      <p:cBhvr>
-                                        <p:cTn id="17" dur="1" fill="hold">
-                                          <p:stCondLst>
-                                            <p:cond delay="0"/>
-                                          </p:stCondLst>
-                                        </p:cTn>
-                                        <p:tgtEl>
-                                          <p:spTgt spid="3">
-                                            <p:txEl>
-                                              <p:pRg st="3" end="3"/>
-                                            </p:txEl>
-                                          </p:spTgt>
-                                        </p:tgtEl>
-                                        <p:attrNameLst>
-                                          <p:attrName>style.visibility</p:attrName>
-                                        </p:attrNameLst>
-                                      </p:cBhvr>
-                                      <p:to>
-                                        <p:strVal val="visible"/>
-                                      </p:to>
-                                    </p:set>
-                                    <p:animEffect transition="in" filter="fade">
-                                      <p:cBhvr>
-                                        <p:cTn id="18" dur="500"/>
-                                        <p:tgtEl>
-                                          <p:spTgt spid="3">
-                                            <p:txEl>
-                                              <p:pRg st="3" end="3"/>
-                                            </p:txEl>
-                                          </p:spTgt>
-                                        </p:tgtEl>
-                                      </p:cBhvr>
-                                    </p:animEffect>
-                                  </p:childTnLst>
-                                </p:cTn>
-                              </p:par>
-                              <p:par>
-                                <p:cTn id="19" presetID="10" presetClass="entr" presetSubtype="0" fill="hold" grpId="0" nodeType="withEffect">
-                                  <p:stCondLst>
-                                    <p:cond delay="0"/>
-                                  </p:stCondLst>
-                                  <p:childTnLst>
-                                    <p:set>
-                                      <p:cBhvr>
-                                        <p:cTn id="20" dur="1" fill="hold">
-                                          <p:stCondLst>
-                                            <p:cond delay="0"/>
-                                          </p:stCondLst>
-                                        </p:cTn>
-                                        <p:tgtEl>
-                                          <p:spTgt spid="3">
-                                            <p:txEl>
-                                              <p:pRg st="4" end="4"/>
-                                            </p:txEl>
-                                          </p:spTgt>
-                                        </p:tgtEl>
-                                        <p:attrNameLst>
-                                          <p:attrName>style.visibility</p:attrName>
-                                        </p:attrNameLst>
-                                      </p:cBhvr>
-                                      <p:to>
-                                        <p:strVal val="visible"/>
-                                      </p:to>
-                                    </p:set>
-                                    <p:animEffect transition="in" filter="fade">
-                                      <p:cBhvr>
-                                        <p:cTn id="21" dur="500"/>
-                                        <p:tgtEl>
-                                          <p:spTgt spid="3">
-                                            <p:txEl>
-                                              <p:pRg st="4" end="4"/>
-                                            </p:txEl>
-                                          </p:spTgt>
-                                        </p:tgtEl>
-                                      </p:cBhvr>
-                                    </p:animEffect>
-                                  </p:childTnLst>
-                                </p:cTn>
-                              </p:par>
-                            </p:childTnLst>
-                          </p:cTn>
-                        </p:par>
-                      </p:childTnLst>
-                    </p:cTn>
-                  </p:par>
-                  <p:par>
-                    <p:cTn id="22" fill="hold">
-                      <p:stCondLst>
-                        <p:cond delay="indefinite"/>
-                      </p:stCondLst>
-                      <p:childTnLst>
-                        <p:par>
-                          <p:cTn id="23" fill="hold">
-                            <p:stCondLst>
-                              <p:cond delay="0"/>
-                            </p:stCondLst>
-                            <p:childTnLst>
-                              <p:par>
-                                <p:cTn id="24" presetID="10" presetClass="entr" presetSubtype="0" fill="hold" grpId="0" nodeType="clickEffect">
-                                  <p:stCondLst>
-                                    <p:cond delay="0"/>
-                                  </p:stCondLst>
-                                  <p:childTnLst>
-                                    <p:set>
-                                      <p:cBhvr>
-                                        <p:cTn id="25" dur="1" fill="hold">
-                                          <p:stCondLst>
-                                            <p:cond delay="0"/>
-                                          </p:stCondLst>
-                                        </p:cTn>
-                                        <p:tgtEl>
-                                          <p:spTgt spid="3">
-                                            <p:txEl>
-                                              <p:pRg st="6" end="6"/>
-                                            </p:txEl>
-                                          </p:spTgt>
-                                        </p:tgtEl>
-                                        <p:attrNameLst>
-                                          <p:attrName>style.visibility</p:attrName>
-                                        </p:attrNameLst>
-                                      </p:cBhvr>
-                                      <p:to>
-                                        <p:strVal val="visible"/>
-                                      </p:to>
-                                    </p:set>
-                                    <p:animEffect transition="in" filter="fade">
-                                      <p:cBhvr>
-                                        <p:cTn id="26" dur="500"/>
-                                        <p:tgtEl>
-                                          <p:spTgt spid="3">
-                                            <p:txEl>
-                                              <p:pRg st="6" end="6"/>
-                                            </p:txEl>
-                                          </p:spTgt>
-                                        </p:tgtEl>
-                                      </p:cBhvr>
-                                    </p:animEffect>
-                                  </p:childTnLst>
-                                </p:cTn>
-                              </p:par>
-                              <p:par>
-                                <p:cTn id="27" presetID="10" presetClass="entr" presetSubtype="0" fill="hold" grpId="0" nodeType="withEffect">
-                                  <p:stCondLst>
-                                    <p:cond delay="0"/>
-                                  </p:stCondLst>
-                                  <p:childTnLst>
-                                    <p:set>
-                                      <p:cBhvr>
-                                        <p:cTn id="28" dur="1" fill="hold">
-                                          <p:stCondLst>
-                                            <p:cond delay="0"/>
-                                          </p:stCondLst>
-                                        </p:cTn>
-                                        <p:tgtEl>
-                                          <p:spTgt spid="3">
-                                            <p:txEl>
-                                              <p:pRg st="7" end="7"/>
-                                            </p:txEl>
-                                          </p:spTgt>
-                                        </p:tgtEl>
-                                        <p:attrNameLst>
-                                          <p:attrName>style.visibility</p:attrName>
-                                        </p:attrNameLst>
-                                      </p:cBhvr>
-                                      <p:to>
-                                        <p:strVal val="visible"/>
-                                      </p:to>
-                                    </p:set>
-                                    <p:animEffect transition="in" filter="fade">
-                                      <p:cBhvr>
-                                        <p:cTn id="29" dur="500"/>
-                                        <p:tgtEl>
-                                          <p:spTgt spid="3">
-                                            <p:txEl>
-                                              <p:pRg st="7" end="7"/>
-                                            </p:txEl>
-                                          </p:spTgt>
-                                        </p:tgtEl>
-                                      </p:cBhvr>
-                                    </p:animEffect>
-                                  </p:childTnLst>
-                                </p:cTn>
-                              </p:par>
-                              <p:par>
-                                <p:cTn id="30" presetID="10" presetClass="entr" presetSubtype="0" fill="hold" grpId="0" nodeType="withEffect">
-                                  <p:stCondLst>
-                                    <p:cond delay="0"/>
-                                  </p:stCondLst>
-                                  <p:childTnLst>
-                                    <p:set>
-                                      <p:cBhvr>
-                                        <p:cTn id="31" dur="1" fill="hold">
-                                          <p:stCondLst>
-                                            <p:cond delay="0"/>
-                                          </p:stCondLst>
-                                        </p:cTn>
-                                        <p:tgtEl>
-                                          <p:spTgt spid="3">
-                                            <p:txEl>
-                                              <p:pRg st="8" end="8"/>
-                                            </p:txEl>
-                                          </p:spTgt>
-                                        </p:tgtEl>
-                                        <p:attrNameLst>
-                                          <p:attrName>style.visibility</p:attrName>
-                                        </p:attrNameLst>
-                                      </p:cBhvr>
-                                      <p:to>
-                                        <p:strVal val="visible"/>
-                                      </p:to>
-                                    </p:set>
-                                    <p:animEffect transition="in" filter="fade">
-                                      <p:cBhvr>
-                                        <p:cTn id="32" dur="500"/>
-                                        <p:tgtEl>
-                                          <p:spTgt spid="3">
-                                            <p:txEl>
-                                              <p:pRg st="8" end="8"/>
-                                            </p:txEl>
-                                          </p:spTgt>
-                                        </p:tgtEl>
-                                      </p:cBhvr>
-                                    </p:animEffect>
-                                  </p:childTnLst>
-                                </p:cTn>
-                              </p:par>
-                            </p:childTnLst>
-                          </p:cTn>
-                        </p:par>
-                      </p:childTnLst>
-                    </p:cTn>
-                  </p:par>
-                  <p:par>
-                    <p:cTn id="33" fill="hold">
-                      <p:stCondLst>
-                        <p:cond delay="indefinite"/>
-                      </p:stCondLst>
-                      <p:childTnLst>
-                        <p:par>
-                          <p:cTn id="34" fill="hold">
-                            <p:stCondLst>
-                              <p:cond delay="0"/>
-                            </p:stCondLst>
-                            <p:childTnLst>
-                              <p:par>
-                                <p:cTn id="35" presetID="10" presetClass="entr" presetSubtype="0" fill="hold" grpId="0" nodeType="clickEffect">
-                                  <p:stCondLst>
-                                    <p:cond delay="0"/>
-                                  </p:stCondLst>
-                                  <p:childTnLst>
-                                    <p:set>
-                                      <p:cBhvr>
-                                        <p:cTn id="36" dur="1" fill="hold">
-                                          <p:stCondLst>
-                                            <p:cond delay="0"/>
-                                          </p:stCondLst>
-                                        </p:cTn>
-                                        <p:tgtEl>
-                                          <p:spTgt spid="3">
-                                            <p:txEl>
-                                              <p:pRg st="9" end="9"/>
-                                            </p:txEl>
-                                          </p:spTgt>
-                                        </p:tgtEl>
-                                        <p:attrNameLst>
-                                          <p:attrName>style.visibility</p:attrName>
-                                        </p:attrNameLst>
-                                      </p:cBhvr>
-                                      <p:to>
-                                        <p:strVal val="visible"/>
-                                      </p:to>
-                                    </p:set>
-                                    <p:animEffect transition="in" filter="fade">
-                                      <p:cBhvr>
-                                        <p:cTn id="37" dur="500"/>
-                                        <p:tgtEl>
-                                          <p:spTgt spid="3">
-                                            <p:txEl>
-                                              <p:pRg st="9" end="9"/>
-                                            </p:txEl>
-                                          </p:spTgt>
-                                        </p:tgtEl>
-                                      </p:cBhvr>
-                                    </p:animEffect>
-                                  </p:childTnLst>
-                                </p:cTn>
-                              </p:par>
-                              <p:par>
-                                <p:cTn id="38" presetID="10" presetClass="entr" presetSubtype="0" fill="hold" grpId="0" nodeType="withEffect">
-                                  <p:stCondLst>
-                                    <p:cond delay="0"/>
-                                  </p:stCondLst>
-                                  <p:childTnLst>
-                                    <p:set>
-                                      <p:cBhvr>
-                                        <p:cTn id="39" dur="1" fill="hold">
-                                          <p:stCondLst>
-                                            <p:cond delay="0"/>
-                                          </p:stCondLst>
-                                        </p:cTn>
-                                        <p:tgtEl>
-                                          <p:spTgt spid="3">
-                                            <p:txEl>
-                                              <p:pRg st="10" end="10"/>
-                                            </p:txEl>
-                                          </p:spTgt>
-                                        </p:tgtEl>
-                                        <p:attrNameLst>
-                                          <p:attrName>style.visibility</p:attrName>
-                                        </p:attrNameLst>
-                                      </p:cBhvr>
-                                      <p:to>
-                                        <p:strVal val="visible"/>
-                                      </p:to>
-                                    </p:set>
-                                    <p:animEffect transition="in" filter="fade">
-                                      <p:cBhvr>
-                                        <p:cTn id="40" dur="500"/>
-                                        <p:tgtEl>
-                                          <p:spTgt spid="3">
-                                            <p:txEl>
-                                              <p:pRg st="10" end="10"/>
-                                            </p:txEl>
-                                          </p:spTgt>
-                                        </p:tgtEl>
-                                      </p:cBhvr>
-                                    </p:animEffect>
-                                  </p:childTnLst>
-                                </p:cTn>
-                              </p:par>
-                            </p:childTnLst>
-                          </p:cTn>
-                        </p:par>
-                      </p:childTnLst>
-                    </p:cTn>
-                  </p:par>
-                </p:childTnLst>
-              </p:cTn>
-              <p:prevCondLst>
-                <p:cond evt="onPrev" delay="0">
-                  <p:tgtEl>
-                    <p:sldTgt/>
-                  </p:tgtEl>
-                </p:cond>
-              </p:prevCondLst>
-              <p:nextCondLst>
-                <p:cond evt="onNext" delay="0">
-                  <p:tgtEl>
-                    <p:sldTgt/>
-                  </p:tgtEl>
-                </p:cond>
-              </p:nextCondLst>
-            </p:seq>
-          </p:childTnLst>
-        </p:cTn>
+        <p:cTn id="1" dur="indefinite" restart="never" nodeType="tmRoot"/>
       </p:par>
     </p:tnLst>
-    <p:bldLst>
-      <p:bldP spid="3" grpId="0" build="p"/>
-    </p:bldLst>
   </p:timing>
 </p:sld>
 </file>
@@ -32484,11 +32125,11 @@
   <p:clrMapOvr>
     <a:masterClrMapping/>
   </p:clrMapOvr>
-  <mc:AlternateContent xmlns:mc="http://schemas.openxmlformats.org/markup-compatibility/2006">
-    <mc:Choice xmlns:p14="http://schemas.microsoft.com/office/powerpoint/2010/main" Requires="p14">
+  <mc:AlternateContent xmlns:mc="http://schemas.openxmlformats.org/markup-compatibility/2006" xmlns:p14="http://schemas.microsoft.com/office/powerpoint/2010/main">
+    <mc:Choice Requires="p14">
       <p:transition p14:dur="0"/>
     </mc:Choice>
-    <mc:Fallback>
+    <mc:Fallback xmlns="">
       <p:transition/>
     </mc:Fallback>
   </mc:AlternateContent>
@@ -32503,6 +32144,861 @@
 </file>
 
 <file path=ppt/slides/slide25.xml><?xml version="1.0" encoding="utf-8"?>
+<p:sld xmlns:a="http://schemas.openxmlformats.org/drawingml/2006/main" xmlns:r="http://schemas.openxmlformats.org/officeDocument/2006/relationships" xmlns:p="http://schemas.openxmlformats.org/presentationml/2006/main">
+  <p:cSld>
+    <p:spTree>
+      <p:nvGrpSpPr>
+        <p:cNvPr id="1" name=""/>
+        <p:cNvGrpSpPr/>
+        <p:nvPr/>
+      </p:nvGrpSpPr>
+      <p:grpSpPr>
+        <a:xfrm>
+          <a:off x="0" y="0"/>
+          <a:ext cx="0" cy="0"/>
+          <a:chOff x="0" y="0"/>
+          <a:chExt cx="0" cy="0"/>
+        </a:xfrm>
+      </p:grpSpPr>
+      <p:sp>
+        <p:nvSpPr>
+          <p:cNvPr id="5" name="Title 4"/>
+          <p:cNvSpPr>
+            <a:spLocks noGrp="1"/>
+          </p:cNvSpPr>
+          <p:nvPr>
+            <p:ph type="title"/>
+          </p:nvPr>
+        </p:nvSpPr>
+        <p:spPr>
+          <a:xfrm>
+            <a:off x="521492" y="229056"/>
+            <a:ext cx="9465518" cy="747791"/>
+          </a:xfrm>
+        </p:spPr>
+        <p:txBody>
+          <a:bodyPr>
+            <a:normAutofit fontScale="90000"/>
+          </a:bodyPr>
+          <a:lstStyle/>
+          <a:p>
+            <a:r>
+              <a:rPr lang="en-US" dirty="0" smtClean="0"/>
+              <a:t>Puntos Clave</a:t>
+            </a:r>
+            <a:endParaRPr lang="en-US" dirty="0"/>
+          </a:p>
+        </p:txBody>
+      </p:sp>
+      <p:sp>
+        <p:nvSpPr>
+          <p:cNvPr id="6" name="Text Placeholder 5"/>
+          <p:cNvSpPr>
+            <a:spLocks noGrp="1"/>
+          </p:cNvSpPr>
+          <p:nvPr>
+            <p:ph type="body" sz="quarter" idx="10"/>
+          </p:nvPr>
+        </p:nvSpPr>
+        <p:spPr>
+          <a:xfrm>
+            <a:off x="521494" y="1157378"/>
+            <a:ext cx="11147432" cy="4231915"/>
+          </a:xfrm>
+        </p:spPr>
+        <p:txBody>
+          <a:bodyPr vert="horz" wrap="square" lIns="91427" tIns="91427" rIns="0" bIns="0" rtlCol="0">
+            <a:spAutoFit/>
+          </a:bodyPr>
+          <a:lstStyle/>
+          <a:p>
+            <a:r>
+              <a:rPr lang="es-AR" sz="3200" dirty="0" smtClean="0"/>
+              <a:t>Media Services es </a:t>
+            </a:r>
+            <a:r>
+              <a:rPr lang="es-AR" sz="3200" b="1" dirty="0" smtClean="0">
+                <a:solidFill>
+                  <a:srgbClr val="00B0F0"/>
+                </a:solidFill>
+              </a:rPr>
+              <a:t>fácil, flexible y potente</a:t>
+            </a:r>
+          </a:p>
+          <a:p>
+            <a:r>
+              <a:rPr lang="es-AR" sz="3200" dirty="0" smtClean="0"/>
+              <a:t>Se puede llegar </a:t>
+            </a:r>
+            <a:r>
+              <a:rPr lang="es-AR" sz="3200" b="1" dirty="0" smtClean="0">
+                <a:solidFill>
+                  <a:srgbClr val="00B0F0"/>
+                </a:solidFill>
+              </a:rPr>
+              <a:t>a cualquier dispositivo </a:t>
+            </a:r>
+          </a:p>
+          <a:p>
+            <a:r>
+              <a:rPr lang="es-AR" sz="3200" dirty="0" smtClean="0"/>
+              <a:t>Ecosistemas de Partners </a:t>
+            </a:r>
+            <a:r>
+              <a:rPr lang="es-AR" sz="3200" b="1" dirty="0" smtClean="0">
+                <a:solidFill>
+                  <a:srgbClr val="00B0F0"/>
+                </a:solidFill>
+              </a:rPr>
+              <a:t>muy rico, de fácil contribución</a:t>
+            </a:r>
+          </a:p>
+          <a:p>
+            <a:r>
+              <a:rPr lang="es-AR" sz="3200" dirty="0" smtClean="0"/>
+              <a:t>Protección de contenido en todos los clientes</a:t>
+            </a:r>
+          </a:p>
+          <a:p>
+            <a:r>
+              <a:rPr lang="es-AR" sz="3200" dirty="0" smtClean="0"/>
+              <a:t>Ad workflow asegurado </a:t>
+            </a:r>
+            <a:r>
+              <a:rPr lang="es-AR" sz="3200" b="1" dirty="0" smtClean="0">
+                <a:solidFill>
+                  <a:srgbClr val="00B0F0"/>
+                </a:solidFill>
+              </a:rPr>
+              <a:t>en todos los clientes</a:t>
+            </a:r>
+          </a:p>
+          <a:p>
+            <a:r>
+              <a:rPr lang="es-AR" sz="3200" dirty="0" smtClean="0"/>
+              <a:t>Pagar por lo que usa, facturación </a:t>
+            </a:r>
+            <a:r>
+              <a:rPr lang="es-AR" sz="3200" b="1" dirty="0" smtClean="0">
+                <a:solidFill>
+                  <a:srgbClr val="00B0F0"/>
+                </a:solidFill>
+              </a:rPr>
+              <a:t>fácil de entender</a:t>
+            </a:r>
+            <a:endParaRPr lang="es-AR" sz="3200" dirty="0" smtClean="0">
+              <a:solidFill>
+                <a:schemeClr val="tx2"/>
+              </a:solidFill>
+            </a:endParaRPr>
+          </a:p>
+          <a:p>
+            <a:r>
+              <a:rPr lang="es-AR" sz="3200" dirty="0" smtClean="0"/>
+              <a:t>Cualquier contenido, en cualquier device, </a:t>
+            </a:r>
+            <a:r>
+              <a:rPr lang="es-AR" sz="3200" b="1" dirty="0" smtClean="0">
+                <a:solidFill>
+                  <a:srgbClr val="00B0F0"/>
+                </a:solidFill>
+              </a:rPr>
+              <a:t>desde la nube</a:t>
+            </a:r>
+            <a:endParaRPr lang="es-AR" sz="3200" b="1" dirty="0">
+              <a:solidFill>
+                <a:srgbClr val="00B0F0"/>
+              </a:solidFill>
+            </a:endParaRPr>
+          </a:p>
+        </p:txBody>
+      </p:sp>
+      <p:sp>
+        <p:nvSpPr>
+          <p:cNvPr id="8" name="Rectangle 7"/>
+          <p:cNvSpPr/>
+          <p:nvPr/>
+        </p:nvSpPr>
+        <p:spPr bwMode="auto">
+          <a:xfrm>
+            <a:off x="9987009" y="487"/>
+            <a:ext cx="2202540" cy="6857027"/>
+          </a:xfrm>
+          <a:prstGeom prst="rect">
+            <a:avLst/>
+          </a:prstGeom>
+          <a:solidFill>
+            <a:srgbClr val="00B0F0"/>
+          </a:solidFill>
+          <a:ln>
+            <a:noFill/>
+            <a:headEnd type="none" w="med" len="med"/>
+            <a:tailEnd type="none" w="med" len="med"/>
+          </a:ln>
+          <a:effectLst/>
+        </p:spPr>
+        <p:style>
+          <a:lnRef idx="1">
+            <a:schemeClr val="accent2"/>
+          </a:lnRef>
+          <a:fillRef idx="3">
+            <a:schemeClr val="accent2"/>
+          </a:fillRef>
+          <a:effectRef idx="2">
+            <a:schemeClr val="accent2"/>
+          </a:effectRef>
+          <a:fontRef idx="minor">
+            <a:schemeClr val="lt1"/>
+          </a:fontRef>
+        </p:style>
+        <p:txBody>
+          <a:bodyPr vert="horz" wrap="square" lIns="91423" tIns="45711" rIns="91423" bIns="45711" numCol="1" rtlCol="0" anchor="ctr" anchorCtr="0" compatLnSpc="1">
+            <a:prstTxWarp prst="textNoShape">
+              <a:avLst/>
+            </a:prstTxWarp>
+          </a:bodyPr>
+          <a:lstStyle/>
+          <a:p>
+            <a:pPr algn="ctr" defTabSz="913924" fontAlgn="base">
+              <a:spcBef>
+                <a:spcPct val="0"/>
+              </a:spcBef>
+              <a:spcAft>
+                <a:spcPct val="0"/>
+              </a:spcAft>
+            </a:pPr>
+            <a:endParaRPr lang="en-US" sz="2200" dirty="0">
+              <a:gradFill>
+                <a:gsLst>
+                  <a:gs pos="0">
+                    <a:srgbClr val="FFFFFF"/>
+                  </a:gs>
+                  <a:gs pos="100000">
+                    <a:srgbClr val="FFFFFF"/>
+                  </a:gs>
+                </a:gsLst>
+                <a:lin ang="5400000" scaled="0"/>
+              </a:gradFill>
+            </a:endParaRPr>
+          </a:p>
+        </p:txBody>
+      </p:sp>
+      <p:sp>
+        <p:nvSpPr>
+          <p:cNvPr id="9" name="Freeform 25"/>
+          <p:cNvSpPr>
+            <a:spLocks noEditPoints="1"/>
+          </p:cNvSpPr>
+          <p:nvPr/>
+        </p:nvSpPr>
+        <p:spPr bwMode="black">
+          <a:xfrm flipH="1">
+            <a:off x="10511918" y="224199"/>
+            <a:ext cx="1152723" cy="981512"/>
+          </a:xfrm>
+          <a:custGeom>
+            <a:avLst/>
+            <a:gdLst>
+              <a:gd name="T0" fmla="*/ 300 w 300"/>
+              <a:gd name="T1" fmla="*/ 201 h 255"/>
+              <a:gd name="T2" fmla="*/ 288 w 300"/>
+              <a:gd name="T3" fmla="*/ 210 h 255"/>
+              <a:gd name="T4" fmla="*/ 285 w 300"/>
+              <a:gd name="T5" fmla="*/ 214 h 255"/>
+              <a:gd name="T6" fmla="*/ 266 w 300"/>
+              <a:gd name="T7" fmla="*/ 230 h 255"/>
+              <a:gd name="T8" fmla="*/ 229 w 300"/>
+              <a:gd name="T9" fmla="*/ 245 h 255"/>
+              <a:gd name="T10" fmla="*/ 169 w 300"/>
+              <a:gd name="T11" fmla="*/ 253 h 255"/>
+              <a:gd name="T12" fmla="*/ 47 w 300"/>
+              <a:gd name="T13" fmla="*/ 231 h 255"/>
+              <a:gd name="T14" fmla="*/ 47 w 300"/>
+              <a:gd name="T15" fmla="*/ 186 h 255"/>
+              <a:gd name="T16" fmla="*/ 89 w 300"/>
+              <a:gd name="T17" fmla="*/ 168 h 255"/>
+              <a:gd name="T18" fmla="*/ 130 w 300"/>
+              <a:gd name="T19" fmla="*/ 171 h 255"/>
+              <a:gd name="T20" fmla="*/ 163 w 300"/>
+              <a:gd name="T21" fmla="*/ 174 h 255"/>
+              <a:gd name="T22" fmla="*/ 198 w 300"/>
+              <a:gd name="T23" fmla="*/ 169 h 255"/>
+              <a:gd name="T24" fmla="*/ 219 w 300"/>
+              <a:gd name="T25" fmla="*/ 182 h 255"/>
+              <a:gd name="T26" fmla="*/ 201 w 300"/>
+              <a:gd name="T27" fmla="*/ 195 h 255"/>
+              <a:gd name="T28" fmla="*/ 174 w 300"/>
+              <a:gd name="T29" fmla="*/ 194 h 255"/>
+              <a:gd name="T30" fmla="*/ 144 w 300"/>
+              <a:gd name="T31" fmla="*/ 202 h 255"/>
+              <a:gd name="T32" fmla="*/ 177 w 300"/>
+              <a:gd name="T33" fmla="*/ 217 h 255"/>
+              <a:gd name="T34" fmla="*/ 223 w 300"/>
+              <a:gd name="T35" fmla="*/ 218 h 255"/>
+              <a:gd name="T36" fmla="*/ 255 w 300"/>
+              <a:gd name="T37" fmla="*/ 209 h 255"/>
+              <a:gd name="T38" fmla="*/ 287 w 300"/>
+              <a:gd name="T39" fmla="*/ 193 h 255"/>
+              <a:gd name="T40" fmla="*/ 300 w 300"/>
+              <a:gd name="T41" fmla="*/ 201 h 255"/>
+              <a:gd name="T42" fmla="*/ 34 w 300"/>
+              <a:gd name="T43" fmla="*/ 173 h 255"/>
+              <a:gd name="T44" fmla="*/ 0 w 300"/>
+              <a:gd name="T45" fmla="*/ 173 h 255"/>
+              <a:gd name="T46" fmla="*/ 0 w 300"/>
+              <a:gd name="T47" fmla="*/ 240 h 255"/>
+              <a:gd name="T48" fmla="*/ 34 w 300"/>
+              <a:gd name="T49" fmla="*/ 240 h 255"/>
+              <a:gd name="T50" fmla="*/ 39 w 300"/>
+              <a:gd name="T51" fmla="*/ 235 h 255"/>
+              <a:gd name="T52" fmla="*/ 39 w 300"/>
+              <a:gd name="T53" fmla="*/ 177 h 255"/>
+              <a:gd name="T54" fmla="*/ 34 w 300"/>
+              <a:gd name="T55" fmla="*/ 173 h 255"/>
+              <a:gd name="T56" fmla="*/ 246 w 300"/>
+              <a:gd name="T57" fmla="*/ 24 h 255"/>
+              <a:gd name="T58" fmla="*/ 246 w 300"/>
+              <a:gd name="T59" fmla="*/ 147 h 255"/>
+              <a:gd name="T60" fmla="*/ 123 w 300"/>
+              <a:gd name="T61" fmla="*/ 147 h 255"/>
+              <a:gd name="T62" fmla="*/ 123 w 300"/>
+              <a:gd name="T63" fmla="*/ 122 h 255"/>
+              <a:gd name="T64" fmla="*/ 99 w 300"/>
+              <a:gd name="T65" fmla="*/ 122 h 255"/>
+              <a:gd name="T66" fmla="*/ 99 w 300"/>
+              <a:gd name="T67" fmla="*/ 0 h 255"/>
+              <a:gd name="T68" fmla="*/ 221 w 300"/>
+              <a:gd name="T69" fmla="*/ 0 h 255"/>
+              <a:gd name="T70" fmla="*/ 221 w 300"/>
+              <a:gd name="T71" fmla="*/ 24 h 255"/>
+              <a:gd name="T72" fmla="*/ 246 w 300"/>
+              <a:gd name="T73" fmla="*/ 24 h 255"/>
+              <a:gd name="T74" fmla="*/ 123 w 300"/>
+              <a:gd name="T75" fmla="*/ 116 h 255"/>
+              <a:gd name="T76" fmla="*/ 123 w 300"/>
+              <a:gd name="T77" fmla="*/ 24 h 255"/>
+              <a:gd name="T78" fmla="*/ 215 w 300"/>
+              <a:gd name="T79" fmla="*/ 24 h 255"/>
+              <a:gd name="T80" fmla="*/ 215 w 300"/>
+              <a:gd name="T81" fmla="*/ 6 h 255"/>
+              <a:gd name="T82" fmla="*/ 105 w 300"/>
+              <a:gd name="T83" fmla="*/ 6 h 255"/>
+              <a:gd name="T84" fmla="*/ 105 w 300"/>
+              <a:gd name="T85" fmla="*/ 116 h 255"/>
+              <a:gd name="T86" fmla="*/ 123 w 300"/>
+              <a:gd name="T87" fmla="*/ 116 h 255"/>
+              <a:gd name="T88" fmla="*/ 224 w 300"/>
+              <a:gd name="T89" fmla="*/ 85 h 255"/>
+              <a:gd name="T90" fmla="*/ 183 w 300"/>
+              <a:gd name="T91" fmla="*/ 56 h 255"/>
+              <a:gd name="T92" fmla="*/ 183 w 300"/>
+              <a:gd name="T93" fmla="*/ 76 h 255"/>
+              <a:gd name="T94" fmla="*/ 145 w 300"/>
+              <a:gd name="T95" fmla="*/ 76 h 255"/>
+              <a:gd name="T96" fmla="*/ 145 w 300"/>
+              <a:gd name="T97" fmla="*/ 94 h 255"/>
+              <a:gd name="T98" fmla="*/ 183 w 300"/>
+              <a:gd name="T99" fmla="*/ 94 h 255"/>
+              <a:gd name="T100" fmla="*/ 183 w 300"/>
+              <a:gd name="T101" fmla="*/ 115 h 255"/>
+              <a:gd name="T102" fmla="*/ 224 w 300"/>
+              <a:gd name="T103" fmla="*/ 85 h 255"/>
+            </a:gdLst>
+            <a:ahLst/>
+            <a:cxnLst>
+              <a:cxn ang="0">
+                <a:pos x="T0" y="T1"/>
+              </a:cxn>
+              <a:cxn ang="0">
+                <a:pos x="T2" y="T3"/>
+              </a:cxn>
+              <a:cxn ang="0">
+                <a:pos x="T4" y="T5"/>
+              </a:cxn>
+              <a:cxn ang="0">
+                <a:pos x="T6" y="T7"/>
+              </a:cxn>
+              <a:cxn ang="0">
+                <a:pos x="T8" y="T9"/>
+              </a:cxn>
+              <a:cxn ang="0">
+                <a:pos x="T10" y="T11"/>
+              </a:cxn>
+              <a:cxn ang="0">
+                <a:pos x="T12" y="T13"/>
+              </a:cxn>
+              <a:cxn ang="0">
+                <a:pos x="T14" y="T15"/>
+              </a:cxn>
+              <a:cxn ang="0">
+                <a:pos x="T16" y="T17"/>
+              </a:cxn>
+              <a:cxn ang="0">
+                <a:pos x="T18" y="T19"/>
+              </a:cxn>
+              <a:cxn ang="0">
+                <a:pos x="T20" y="T21"/>
+              </a:cxn>
+              <a:cxn ang="0">
+                <a:pos x="T22" y="T23"/>
+              </a:cxn>
+              <a:cxn ang="0">
+                <a:pos x="T24" y="T25"/>
+              </a:cxn>
+              <a:cxn ang="0">
+                <a:pos x="T26" y="T27"/>
+              </a:cxn>
+              <a:cxn ang="0">
+                <a:pos x="T28" y="T29"/>
+              </a:cxn>
+              <a:cxn ang="0">
+                <a:pos x="T30" y="T31"/>
+              </a:cxn>
+              <a:cxn ang="0">
+                <a:pos x="T32" y="T33"/>
+              </a:cxn>
+              <a:cxn ang="0">
+                <a:pos x="T34" y="T35"/>
+              </a:cxn>
+              <a:cxn ang="0">
+                <a:pos x="T36" y="T37"/>
+              </a:cxn>
+              <a:cxn ang="0">
+                <a:pos x="T38" y="T39"/>
+              </a:cxn>
+              <a:cxn ang="0">
+                <a:pos x="T40" y="T41"/>
+              </a:cxn>
+              <a:cxn ang="0">
+                <a:pos x="T42" y="T43"/>
+              </a:cxn>
+              <a:cxn ang="0">
+                <a:pos x="T44" y="T45"/>
+              </a:cxn>
+              <a:cxn ang="0">
+                <a:pos x="T46" y="T47"/>
+              </a:cxn>
+              <a:cxn ang="0">
+                <a:pos x="T48" y="T49"/>
+              </a:cxn>
+              <a:cxn ang="0">
+                <a:pos x="T50" y="T51"/>
+              </a:cxn>
+              <a:cxn ang="0">
+                <a:pos x="T52" y="T53"/>
+              </a:cxn>
+              <a:cxn ang="0">
+                <a:pos x="T54" y="T55"/>
+              </a:cxn>
+              <a:cxn ang="0">
+                <a:pos x="T56" y="T57"/>
+              </a:cxn>
+              <a:cxn ang="0">
+                <a:pos x="T58" y="T59"/>
+              </a:cxn>
+              <a:cxn ang="0">
+                <a:pos x="T60" y="T61"/>
+              </a:cxn>
+              <a:cxn ang="0">
+                <a:pos x="T62" y="T63"/>
+              </a:cxn>
+              <a:cxn ang="0">
+                <a:pos x="T64" y="T65"/>
+              </a:cxn>
+              <a:cxn ang="0">
+                <a:pos x="T66" y="T67"/>
+              </a:cxn>
+              <a:cxn ang="0">
+                <a:pos x="T68" y="T69"/>
+              </a:cxn>
+              <a:cxn ang="0">
+                <a:pos x="T70" y="T71"/>
+              </a:cxn>
+              <a:cxn ang="0">
+                <a:pos x="T72" y="T73"/>
+              </a:cxn>
+              <a:cxn ang="0">
+                <a:pos x="T74" y="T75"/>
+              </a:cxn>
+              <a:cxn ang="0">
+                <a:pos x="T76" y="T77"/>
+              </a:cxn>
+              <a:cxn ang="0">
+                <a:pos x="T78" y="T79"/>
+              </a:cxn>
+              <a:cxn ang="0">
+                <a:pos x="T80" y="T81"/>
+              </a:cxn>
+              <a:cxn ang="0">
+                <a:pos x="T82" y="T83"/>
+              </a:cxn>
+              <a:cxn ang="0">
+                <a:pos x="T84" y="T85"/>
+              </a:cxn>
+              <a:cxn ang="0">
+                <a:pos x="T86" y="T87"/>
+              </a:cxn>
+              <a:cxn ang="0">
+                <a:pos x="T88" y="T89"/>
+              </a:cxn>
+              <a:cxn ang="0">
+                <a:pos x="T90" y="T91"/>
+              </a:cxn>
+              <a:cxn ang="0">
+                <a:pos x="T92" y="T93"/>
+              </a:cxn>
+              <a:cxn ang="0">
+                <a:pos x="T94" y="T95"/>
+              </a:cxn>
+              <a:cxn ang="0">
+                <a:pos x="T96" y="T97"/>
+              </a:cxn>
+              <a:cxn ang="0">
+                <a:pos x="T98" y="T99"/>
+              </a:cxn>
+              <a:cxn ang="0">
+                <a:pos x="T100" y="T101"/>
+              </a:cxn>
+              <a:cxn ang="0">
+                <a:pos x="T102" y="T103"/>
+              </a:cxn>
+            </a:cxnLst>
+            <a:rect l="0" t="0" r="r" b="b"/>
+            <a:pathLst>
+              <a:path w="300" h="255">
+                <a:moveTo>
+                  <a:pt x="300" y="201"/>
+                </a:moveTo>
+                <a:cubicBezTo>
+                  <a:pt x="300" y="201"/>
+                  <a:pt x="299" y="202"/>
+                  <a:pt x="288" y="210"/>
+                </a:cubicBezTo>
+                <a:cubicBezTo>
+                  <a:pt x="288" y="210"/>
+                  <a:pt x="286" y="214"/>
+                  <a:pt x="285" y="214"/>
+                </a:cubicBezTo>
+                <a:cubicBezTo>
+                  <a:pt x="280" y="218"/>
+                  <a:pt x="275" y="223"/>
+                  <a:pt x="266" y="230"/>
+                </a:cubicBezTo>
+                <a:cubicBezTo>
+                  <a:pt x="257" y="231"/>
+                  <a:pt x="238" y="240"/>
+                  <a:pt x="229" y="245"/>
+                </a:cubicBezTo>
+                <a:cubicBezTo>
+                  <a:pt x="212" y="244"/>
+                  <a:pt x="187" y="248"/>
+                  <a:pt x="169" y="253"/>
+                </a:cubicBezTo>
+                <a:cubicBezTo>
+                  <a:pt x="143" y="249"/>
+                  <a:pt x="140" y="255"/>
+                  <a:pt x="47" y="231"/>
+                </a:cubicBezTo>
+                <a:cubicBezTo>
+                  <a:pt x="47" y="231"/>
+                  <a:pt x="47" y="194"/>
+                  <a:pt x="47" y="186"/>
+                </a:cubicBezTo>
+                <a:cubicBezTo>
+                  <a:pt x="64" y="182"/>
+                  <a:pt x="69" y="171"/>
+                  <a:pt x="89" y="168"/>
+                </a:cubicBezTo>
+                <a:cubicBezTo>
+                  <a:pt x="103" y="166"/>
+                  <a:pt x="116" y="167"/>
+                  <a:pt x="130" y="171"/>
+                </a:cubicBezTo>
+                <a:cubicBezTo>
+                  <a:pt x="139" y="174"/>
+                  <a:pt x="148" y="176"/>
+                  <a:pt x="163" y="174"/>
+                </a:cubicBezTo>
+                <a:cubicBezTo>
+                  <a:pt x="176" y="173"/>
+                  <a:pt x="181" y="169"/>
+                  <a:pt x="198" y="169"/>
+                </a:cubicBezTo>
+                <a:cubicBezTo>
+                  <a:pt x="209" y="169"/>
+                  <a:pt x="220" y="176"/>
+                  <a:pt x="219" y="182"/>
+                </a:cubicBezTo>
+                <a:cubicBezTo>
+                  <a:pt x="219" y="188"/>
+                  <a:pt x="208" y="194"/>
+                  <a:pt x="201" y="195"/>
+                </a:cubicBezTo>
+                <a:cubicBezTo>
+                  <a:pt x="185" y="195"/>
+                  <a:pt x="189" y="194"/>
+                  <a:pt x="174" y="194"/>
+                </a:cubicBezTo>
+                <a:cubicBezTo>
+                  <a:pt x="156" y="194"/>
+                  <a:pt x="155" y="197"/>
+                  <a:pt x="144" y="202"/>
+                </a:cubicBezTo>
+                <a:cubicBezTo>
+                  <a:pt x="155" y="205"/>
+                  <a:pt x="162" y="209"/>
+                  <a:pt x="177" y="217"/>
+                </a:cubicBezTo>
+                <a:cubicBezTo>
+                  <a:pt x="193" y="215"/>
+                  <a:pt x="209" y="217"/>
+                  <a:pt x="223" y="218"/>
+                </a:cubicBezTo>
+                <a:cubicBezTo>
+                  <a:pt x="235" y="215"/>
+                  <a:pt x="241" y="210"/>
+                  <a:pt x="255" y="209"/>
+                </a:cubicBezTo>
+                <a:cubicBezTo>
+                  <a:pt x="264" y="202"/>
+                  <a:pt x="276" y="191"/>
+                  <a:pt x="287" y="193"/>
+                </a:cubicBezTo>
+                <a:cubicBezTo>
+                  <a:pt x="293" y="194"/>
+                  <a:pt x="300" y="201"/>
+                  <a:pt x="300" y="201"/>
+                </a:cubicBezTo>
+                <a:close/>
+                <a:moveTo>
+                  <a:pt x="34" y="173"/>
+                </a:moveTo>
+                <a:cubicBezTo>
+                  <a:pt x="0" y="173"/>
+                  <a:pt x="0" y="173"/>
+                  <a:pt x="0" y="173"/>
+                </a:cubicBezTo>
+                <a:cubicBezTo>
+                  <a:pt x="0" y="240"/>
+                  <a:pt x="0" y="240"/>
+                  <a:pt x="0" y="240"/>
+                </a:cubicBezTo>
+                <a:cubicBezTo>
+                  <a:pt x="34" y="240"/>
+                  <a:pt x="34" y="240"/>
+                  <a:pt x="34" y="240"/>
+                </a:cubicBezTo>
+                <a:cubicBezTo>
+                  <a:pt x="37" y="240"/>
+                  <a:pt x="39" y="238"/>
+                  <a:pt x="39" y="235"/>
+                </a:cubicBezTo>
+                <a:cubicBezTo>
+                  <a:pt x="39" y="177"/>
+                  <a:pt x="39" y="177"/>
+                  <a:pt x="39" y="177"/>
+                </a:cubicBezTo>
+                <a:cubicBezTo>
+                  <a:pt x="39" y="175"/>
+                  <a:pt x="37" y="173"/>
+                  <a:pt x="34" y="173"/>
+                </a:cubicBezTo>
+                <a:close/>
+                <a:moveTo>
+                  <a:pt x="246" y="24"/>
+                </a:moveTo>
+                <a:cubicBezTo>
+                  <a:pt x="246" y="147"/>
+                  <a:pt x="246" y="147"/>
+                  <a:pt x="246" y="147"/>
+                </a:cubicBezTo>
+                <a:cubicBezTo>
+                  <a:pt x="123" y="147"/>
+                  <a:pt x="123" y="147"/>
+                  <a:pt x="123" y="147"/>
+                </a:cubicBezTo>
+                <a:cubicBezTo>
+                  <a:pt x="123" y="122"/>
+                  <a:pt x="123" y="122"/>
+                  <a:pt x="123" y="122"/>
+                </a:cubicBezTo>
+                <a:cubicBezTo>
+                  <a:pt x="99" y="122"/>
+                  <a:pt x="99" y="122"/>
+                  <a:pt x="99" y="122"/>
+                </a:cubicBezTo>
+                <a:cubicBezTo>
+                  <a:pt x="99" y="0"/>
+                  <a:pt x="99" y="0"/>
+                  <a:pt x="99" y="0"/>
+                </a:cubicBezTo>
+                <a:cubicBezTo>
+                  <a:pt x="221" y="0"/>
+                  <a:pt x="221" y="0"/>
+                  <a:pt x="221" y="0"/>
+                </a:cubicBezTo>
+                <a:cubicBezTo>
+                  <a:pt x="221" y="24"/>
+                  <a:pt x="221" y="24"/>
+                  <a:pt x="221" y="24"/>
+                </a:cubicBezTo>
+                <a:lnTo>
+                  <a:pt x="246" y="24"/>
+                </a:lnTo>
+                <a:close/>
+                <a:moveTo>
+                  <a:pt x="123" y="116"/>
+                </a:moveTo>
+                <a:cubicBezTo>
+                  <a:pt x="123" y="24"/>
+                  <a:pt x="123" y="24"/>
+                  <a:pt x="123" y="24"/>
+                </a:cubicBezTo>
+                <a:cubicBezTo>
+                  <a:pt x="215" y="24"/>
+                  <a:pt x="215" y="24"/>
+                  <a:pt x="215" y="24"/>
+                </a:cubicBezTo>
+                <a:cubicBezTo>
+                  <a:pt x="215" y="6"/>
+                  <a:pt x="215" y="6"/>
+                  <a:pt x="215" y="6"/>
+                </a:cubicBezTo>
+                <a:cubicBezTo>
+                  <a:pt x="105" y="6"/>
+                  <a:pt x="105" y="6"/>
+                  <a:pt x="105" y="6"/>
+                </a:cubicBezTo>
+                <a:cubicBezTo>
+                  <a:pt x="105" y="116"/>
+                  <a:pt x="105" y="116"/>
+                  <a:pt x="105" y="116"/>
+                </a:cubicBezTo>
+                <a:lnTo>
+                  <a:pt x="123" y="116"/>
+                </a:lnTo>
+                <a:close/>
+                <a:moveTo>
+                  <a:pt x="224" y="85"/>
+                </a:moveTo>
+                <a:cubicBezTo>
+                  <a:pt x="183" y="56"/>
+                  <a:pt x="183" y="56"/>
+                  <a:pt x="183" y="56"/>
+                </a:cubicBezTo>
+                <a:cubicBezTo>
+                  <a:pt x="183" y="76"/>
+                  <a:pt x="183" y="76"/>
+                  <a:pt x="183" y="76"/>
+                </a:cubicBezTo>
+                <a:cubicBezTo>
+                  <a:pt x="145" y="76"/>
+                  <a:pt x="145" y="76"/>
+                  <a:pt x="145" y="76"/>
+                </a:cubicBezTo>
+                <a:cubicBezTo>
+                  <a:pt x="145" y="94"/>
+                  <a:pt x="145" y="94"/>
+                  <a:pt x="145" y="94"/>
+                </a:cubicBezTo>
+                <a:cubicBezTo>
+                  <a:pt x="183" y="94"/>
+                  <a:pt x="183" y="94"/>
+                  <a:pt x="183" y="94"/>
+                </a:cubicBezTo>
+                <a:cubicBezTo>
+                  <a:pt x="183" y="115"/>
+                  <a:pt x="183" y="115"/>
+                  <a:pt x="183" y="115"/>
+                </a:cubicBezTo>
+                <a:lnTo>
+                  <a:pt x="224" y="85"/>
+                </a:lnTo>
+                <a:close/>
+              </a:path>
+            </a:pathLst>
+          </a:custGeom>
+          <a:solidFill>
+            <a:srgbClr val="FFFFFF"/>
+          </a:solidFill>
+          <a:ln>
+            <a:noFill/>
+          </a:ln>
+        </p:spPr>
+        <p:txBody>
+          <a:bodyPr vert="horz" wrap="square" lIns="82293" tIns="41147" rIns="82293" bIns="41147" numCol="1" anchor="t" anchorCtr="0" compatLnSpc="1">
+            <a:prstTxWarp prst="textNoShape">
+              <a:avLst/>
+            </a:prstTxWarp>
+          </a:bodyPr>
+          <a:lstStyle/>
+          <a:p>
+            <a:pPr defTabSz="914188"/>
+            <a:endParaRPr lang="en-US" sz="1600">
+              <a:solidFill>
+                <a:srgbClr val="292929"/>
+              </a:solidFill>
+            </a:endParaRPr>
+          </a:p>
+        </p:txBody>
+      </p:sp>
+      <p:pic>
+        <p:nvPicPr>
+          <p:cNvPr id="2" name="Picture 1"/>
+          <p:cNvPicPr>
+            <a:picLocks noChangeAspect="1"/>
+          </p:cNvPicPr>
+          <p:nvPr/>
+        </p:nvPicPr>
+        <p:blipFill>
+          <a:blip r:embed="rId3"/>
+          <a:stretch>
+            <a:fillRect/>
+          </a:stretch>
+        </p:blipFill>
+        <p:spPr>
+          <a:xfrm>
+            <a:off x="521492" y="6290623"/>
+            <a:ext cx="1971675" cy="581025"/>
+          </a:xfrm>
+          <a:prstGeom prst="rect">
+            <a:avLst/>
+          </a:prstGeom>
+        </p:spPr>
+      </p:pic>
+    </p:spTree>
+    <p:extLst>
+      <p:ext uri="{BB962C8B-B14F-4D97-AF65-F5344CB8AC3E}">
+        <p14:creationId xmlns:p14="http://schemas.microsoft.com/office/powerpoint/2010/main" val="2096704562"/>
+      </p:ext>
+    </p:extLst>
+  </p:cSld>
+  <p:clrMapOvr>
+    <a:masterClrMapping/>
+  </p:clrMapOvr>
+  <mc:AlternateContent xmlns:mc="http://schemas.openxmlformats.org/markup-compatibility/2006">
+    <mc:Choice xmlns:p14="http://schemas.microsoft.com/office/powerpoint/2010/main" Requires="p14">
+      <p:transition spd="med" p14:dur="700">
+        <p:fade/>
+      </p:transition>
+    </mc:Choice>
+    <mc:Fallback>
+      <p:transition spd="med">
+        <p:fade/>
+      </p:transition>
+    </mc:Fallback>
+  </mc:AlternateContent>
+  <p:timing>
+    <p:tnLst>
+      <p:par>
+        <p:cTn id="1" dur="indefinite" restart="never" nodeType="tmRoot"/>
+      </p:par>
+    </p:tnLst>
+  </p:timing>
+</p:sld>
+</file>
+
+<file path=ppt/slides/slide26.xml><?xml version="1.0" encoding="utf-8"?>
 <p:sld xmlns:a="http://schemas.openxmlformats.org/drawingml/2006/main" xmlns:r="http://schemas.openxmlformats.org/officeDocument/2006/relationships" xmlns:p="http://schemas.openxmlformats.org/presentationml/2006/main">
   <p:cSld>
     <p:bg>
@@ -32900,11 +33396,11 @@
   <p:clrMapOvr>
     <a:masterClrMapping/>
   </p:clrMapOvr>
-  <mc:AlternateContent xmlns:mc="http://schemas.openxmlformats.org/markup-compatibility/2006">
-    <mc:Choice xmlns:p14="http://schemas.microsoft.com/office/powerpoint/2010/main" Requires="p14">
+  <mc:AlternateContent xmlns:mc="http://schemas.openxmlformats.org/markup-compatibility/2006" xmlns:p14="http://schemas.microsoft.com/office/powerpoint/2010/main">
+    <mc:Choice Requires="p14">
       <p:transition p14:dur="0"/>
     </mc:Choice>
-    <mc:Fallback>
+    <mc:Fallback xmlns="">
       <p:transition/>
     </mc:Fallback>
   </mc:AlternateContent>
@@ -33183,15 +33679,7 @@
               </a:pPr>
               <a:r>
                 <a:rPr lang="es-AR" sz="2000" dirty="0"/>
-                <a:t>Demo: Usando el portal de Windows Azure </a:t>
-              </a:r>
-              <a:r>
-                <a:rPr lang="es-AR" sz="2000" dirty="0"/>
-                <a:t>para Media </a:t>
-              </a:r>
-              <a:r>
-                <a:rPr lang="es-AR" sz="2000" dirty="0"/>
-                <a:t>Services</a:t>
+                <a:t>Demo: Usando el portal de Windows Azure para Media Services</a:t>
               </a:r>
             </a:p>
             <a:p>
@@ -33439,11 +33927,11 @@
   <p:clrMapOvr>
     <a:masterClrMapping/>
   </p:clrMapOvr>
-  <mc:AlternateContent xmlns:mc="http://schemas.openxmlformats.org/markup-compatibility/2006">
-    <mc:Choice xmlns:p14="http://schemas.microsoft.com/office/powerpoint/2010/main" Requires="p14">
+  <mc:AlternateContent xmlns:mc="http://schemas.openxmlformats.org/markup-compatibility/2006" xmlns:p14="http://schemas.microsoft.com/office/powerpoint/2010/main">
+    <mc:Choice Requires="p14">
       <p:transition p14:dur="0"/>
     </mc:Choice>
-    <mc:Fallback>
+    <mc:Fallback xmlns="">
       <p:transition/>
     </mc:Fallback>
   </mc:AlternateContent>
@@ -33758,16 +34246,6 @@
               </a:rPr>
               <a:t>100 M</a:t>
             </a:r>
-            <a:endParaRPr lang="es-AR" sz="4949" spc="-113" dirty="0">
-              <a:solidFill>
-                <a:schemeClr val="bg1">
-                  <a:lumMod val="75000"/>
-                </a:schemeClr>
-              </a:solidFill>
-              <a:latin typeface="Kozuka Gothic Pro B" panose="020B0800000000000000" pitchFamily="34" charset="-128"/>
-              <a:ea typeface="Kozuka Gothic Pro B" panose="020B0800000000000000" pitchFamily="34" charset="-128"/>
-              <a:cs typeface="Mongolian Baiti" panose="03000500000000000000" pitchFamily="66" charset="0"/>
-            </a:endParaRPr>
           </a:p>
         </p:txBody>
       </p:sp>
@@ -33977,10 +34455,6 @@
               </a:rPr>
               <a:t>TIENEN AL MENOS UNA</a:t>
             </a:r>
-            <a:endParaRPr lang="es-AR" sz="2400" b="1" dirty="0">
-              <a:latin typeface="Gulim" panose="020B0600000101010101" pitchFamily="34" charset="-127"/>
-              <a:ea typeface="Gulim" panose="020B0600000101010101" pitchFamily="34" charset="-127"/>
-            </a:endParaRPr>
           </a:p>
         </p:txBody>
       </p:sp>
@@ -34136,14 +34610,6 @@
               </a:rPr>
               <a:t>50%</a:t>
             </a:r>
-            <a:endParaRPr lang="es-AR" sz="4499" spc="-113" dirty="0">
-              <a:solidFill>
-                <a:srgbClr val="FFC000"/>
-              </a:solidFill>
-              <a:latin typeface="Kozuka Gothic Pro B" panose="020B0800000000000000" pitchFamily="34" charset="-128"/>
-              <a:ea typeface="Kozuka Gothic Pro B" panose="020B0800000000000000" pitchFamily="34" charset="-128"/>
-              <a:cs typeface="Mongolian Baiti" panose="03000500000000000000" pitchFamily="66" charset="0"/>
-            </a:endParaRPr>
           </a:p>
         </p:txBody>
       </p:sp>
@@ -34181,16 +34647,6 @@
               </a:rPr>
               <a:t>SMARTPHONES</a:t>
             </a:r>
-            <a:endParaRPr lang="es-AR" sz="1725" b="1" dirty="0">
-              <a:solidFill>
-                <a:schemeClr val="tx1">
-                  <a:lumMod val="95000"/>
-                  <a:lumOff val="5000"/>
-                </a:schemeClr>
-              </a:solidFill>
-              <a:latin typeface="Gulim" panose="020B0600000101010101" pitchFamily="34" charset="-127"/>
-              <a:ea typeface="Gulim" panose="020B0600000101010101" pitchFamily="34" charset="-127"/>
-            </a:endParaRPr>
           </a:p>
         </p:txBody>
       </p:sp>
@@ -34340,58 +34796,6 @@
       </p:pic>
       <p:sp>
         <p:nvSpPr>
-          <p:cNvPr id="26" name="Rectangle 25"/>
-          <p:cNvSpPr/>
-          <p:nvPr/>
-        </p:nvSpPr>
-        <p:spPr>
-          <a:xfrm>
-            <a:off x="7333628" y="3716487"/>
-            <a:ext cx="1072538" cy="715452"/>
-          </a:xfrm>
-          <a:prstGeom prst="rect">
-            <a:avLst/>
-          </a:prstGeom>
-        </p:spPr>
-        <p:txBody>
-          <a:bodyPr wrap="none">
-            <a:spAutoFit/>
-          </a:bodyPr>
-          <a:lstStyle/>
-          <a:p>
-            <a:pPr>
-              <a:lnSpc>
-                <a:spcPct val="90000"/>
-              </a:lnSpc>
-              <a:spcBef>
-                <a:spcPct val="20000"/>
-              </a:spcBef>
-              <a:buSzPct val="80000"/>
-            </a:pPr>
-            <a:r>
-              <a:rPr lang="es-AR" sz="4499" spc="-113" dirty="0">
-                <a:solidFill>
-                  <a:srgbClr val="FFC000"/>
-                </a:solidFill>
-                <a:latin typeface="Kozuka Gothic Pro B" panose="020B0800000000000000" pitchFamily="34" charset="-128"/>
-                <a:ea typeface="Kozuka Gothic Pro B" panose="020B0800000000000000" pitchFamily="34" charset="-128"/>
-                <a:cs typeface="Mongolian Baiti" panose="03000500000000000000" pitchFamily="66" charset="0"/>
-              </a:rPr>
-              <a:t>19%</a:t>
-            </a:r>
-            <a:endParaRPr lang="es-AR" sz="4499" spc="-113" dirty="0">
-              <a:solidFill>
-                <a:srgbClr val="FFC000"/>
-              </a:solidFill>
-              <a:latin typeface="Kozuka Gothic Pro B" panose="020B0800000000000000" pitchFamily="34" charset="-128"/>
-              <a:ea typeface="Kozuka Gothic Pro B" panose="020B0800000000000000" pitchFamily="34" charset="-128"/>
-              <a:cs typeface="Mongolian Baiti" panose="03000500000000000000" pitchFamily="66" charset="0"/>
-            </a:endParaRPr>
-          </a:p>
-        </p:txBody>
-      </p:sp>
-      <p:sp>
-        <p:nvSpPr>
           <p:cNvPr id="27" name="Rectangle 26"/>
           <p:cNvSpPr/>
           <p:nvPr/>
@@ -34424,16 +34828,6 @@
               </a:rPr>
               <a:t>TABLETS</a:t>
             </a:r>
-            <a:endParaRPr lang="es-AR" sz="1725" b="1" dirty="0">
-              <a:solidFill>
-                <a:schemeClr val="tx1">
-                  <a:lumMod val="95000"/>
-                  <a:lumOff val="5000"/>
-                </a:schemeClr>
-              </a:solidFill>
-              <a:latin typeface="Gulim" panose="020B0600000101010101" pitchFamily="34" charset="-127"/>
-              <a:ea typeface="Gulim" panose="020B0600000101010101" pitchFamily="34" charset="-127"/>
-            </a:endParaRPr>
           </a:p>
         </p:txBody>
       </p:sp>
@@ -34833,16 +35227,6 @@
               </a:rPr>
               <a:t>MULTIPLES TAREAS</a:t>
             </a:r>
-            <a:endParaRPr lang="es-AR" sz="3000" b="1" dirty="0">
-              <a:solidFill>
-                <a:schemeClr val="tx1">
-                  <a:lumMod val="75000"/>
-                  <a:lumOff val="25000"/>
-                </a:schemeClr>
-              </a:solidFill>
-              <a:latin typeface="Gulim" panose="020B0600000101010101" pitchFamily="34" charset="-127"/>
-              <a:ea typeface="Gulim" panose="020B0600000101010101" pitchFamily="34" charset="-127"/>
-            </a:endParaRPr>
           </a:p>
         </p:txBody>
       </p:sp>
@@ -34877,65 +35261,6 @@
               </a:rPr>
               <a:t>MIENTRAS MIRAN TV</a:t>
             </a:r>
-            <a:endParaRPr lang="es-AR" sz="1351" b="1" dirty="0">
-              <a:solidFill>
-                <a:srgbClr val="00B0F0"/>
-              </a:solidFill>
-              <a:latin typeface="Gulim" panose="020B0600000101010101" pitchFamily="34" charset="-127"/>
-              <a:ea typeface="Gulim" panose="020B0600000101010101" pitchFamily="34" charset="-127"/>
-            </a:endParaRPr>
-          </a:p>
-        </p:txBody>
-      </p:sp>
-      <p:sp>
-        <p:nvSpPr>
-          <p:cNvPr id="35" name="Rectangle 34"/>
-          <p:cNvSpPr/>
-          <p:nvPr/>
-        </p:nvSpPr>
-        <p:spPr>
-          <a:xfrm>
-            <a:off x="5636680" y="5161820"/>
-            <a:ext cx="1157496" cy="715452"/>
-          </a:xfrm>
-          <a:prstGeom prst="rect">
-            <a:avLst/>
-          </a:prstGeom>
-        </p:spPr>
-        <p:txBody>
-          <a:bodyPr wrap="none">
-            <a:spAutoFit/>
-          </a:bodyPr>
-          <a:lstStyle/>
-          <a:p>
-            <a:pPr>
-              <a:lnSpc>
-                <a:spcPct val="90000"/>
-              </a:lnSpc>
-              <a:spcBef>
-                <a:spcPct val="20000"/>
-              </a:spcBef>
-              <a:buSzPct val="80000"/>
-            </a:pPr>
-            <a:r>
-              <a:rPr lang="es-AR" sz="4499" spc="-113" dirty="0">
-                <a:solidFill>
-                  <a:srgbClr val="FFC000"/>
-                </a:solidFill>
-                <a:latin typeface="Kozuka Gothic Pro B" panose="020B0800000000000000" pitchFamily="34" charset="-128"/>
-                <a:ea typeface="Kozuka Gothic Pro B" panose="020B0800000000000000" pitchFamily="34" charset="-128"/>
-                <a:cs typeface="Mongolian Baiti" panose="03000500000000000000" pitchFamily="66" charset="0"/>
-              </a:rPr>
-              <a:t>80%</a:t>
-            </a:r>
-            <a:endParaRPr lang="es-AR" sz="4499" spc="-113" dirty="0">
-              <a:solidFill>
-                <a:srgbClr val="FFC000"/>
-              </a:solidFill>
-              <a:latin typeface="Kozuka Gothic Pro B" panose="020B0800000000000000" pitchFamily="34" charset="-128"/>
-              <a:ea typeface="Kozuka Gothic Pro B" panose="020B0800000000000000" pitchFamily="34" charset="-128"/>
-              <a:cs typeface="Mongolian Baiti" panose="03000500000000000000" pitchFamily="66" charset="0"/>
-            </a:endParaRPr>
           </a:p>
         </p:txBody>
       </p:sp>
@@ -35089,53 +35414,6 @@
       </p:sp>
       <p:sp>
         <p:nvSpPr>
-          <p:cNvPr id="38" name="Rectangle 37"/>
-          <p:cNvSpPr/>
-          <p:nvPr/>
-        </p:nvSpPr>
-        <p:spPr>
-          <a:xfrm>
-            <a:off x="7720276" y="4889931"/>
-            <a:ext cx="2378408" cy="646331"/>
-          </a:xfrm>
-          <a:prstGeom prst="rect">
-            <a:avLst/>
-          </a:prstGeom>
-        </p:spPr>
-        <p:txBody>
-          <a:bodyPr wrap="none">
-            <a:spAutoFit/>
-          </a:bodyPr>
-          <a:lstStyle/>
-          <a:p>
-            <a:r>
-              <a:rPr lang="es-AR" sz="3600" spc="-113" dirty="0">
-                <a:solidFill>
-                  <a:schemeClr val="bg1">
-                    <a:lumMod val="75000"/>
-                  </a:schemeClr>
-                </a:solidFill>
-                <a:latin typeface="Kozuka Gothic Pro B" panose="020B0800000000000000" pitchFamily="34" charset="-128"/>
-                <a:ea typeface="Kozuka Gothic Pro B" panose="020B0800000000000000" pitchFamily="34" charset="-128"/>
-                <a:cs typeface="Mongolian Baiti" panose="03000500000000000000" pitchFamily="66" charset="0"/>
-              </a:rPr>
-              <a:t>10k Millones</a:t>
-            </a:r>
-            <a:endParaRPr lang="es-AR" sz="3600" spc="-113" dirty="0">
-              <a:solidFill>
-                <a:schemeClr val="bg1">
-                  <a:lumMod val="75000"/>
-                </a:schemeClr>
-              </a:solidFill>
-              <a:latin typeface="Kozuka Gothic Pro B" panose="020B0800000000000000" pitchFamily="34" charset="-128"/>
-              <a:ea typeface="Kozuka Gothic Pro B" panose="020B0800000000000000" pitchFamily="34" charset="-128"/>
-              <a:cs typeface="Mongolian Baiti" panose="03000500000000000000" pitchFamily="66" charset="0"/>
-            </a:endParaRPr>
-          </a:p>
-        </p:txBody>
-      </p:sp>
-      <p:sp>
-        <p:nvSpPr>
           <p:cNvPr id="39" name="Rectangle 38"/>
           <p:cNvSpPr/>
           <p:nvPr/>
@@ -35163,11 +35441,6 @@
               </a:rPr>
               <a:t>DISPOSITIVOS MOBILES CONECTADOS</a:t>
             </a:r>
-            <a:endParaRPr lang="es-AR" sz="1300" b="1" dirty="0">
-              <a:solidFill>
-                <a:srgbClr val="00B0F0"/>
-              </a:solidFill>
-            </a:endParaRPr>
           </a:p>
         </p:txBody>
       </p:sp>
@@ -35261,17 +35534,6 @@
               </a:rPr>
               <a:t>2016</a:t>
             </a:r>
-            <a:endParaRPr lang="es-AR" sz="3300" spc="-113" dirty="0">
-              <a:solidFill>
-                <a:schemeClr val="accent6">
-                  <a:lumMod val="40000"/>
-                  <a:lumOff val="60000"/>
-                </a:schemeClr>
-              </a:solidFill>
-              <a:latin typeface="Kozuka Gothic Pro B" panose="020B0800000000000000" pitchFamily="34" charset="-128"/>
-              <a:ea typeface="Kozuka Gothic Pro B" panose="020B0800000000000000" pitchFamily="34" charset="-128"/>
-              <a:cs typeface="Mongolian Baiti" panose="03000500000000000000" pitchFamily="66" charset="0"/>
-            </a:endParaRPr>
           </a:p>
         </p:txBody>
       </p:sp>
@@ -35330,6 +35592,96 @@
           </a:p>
         </p:txBody>
       </p:sp>
+      <p:pic>
+        <p:nvPicPr>
+          <p:cNvPr id="4" name="Picture 3"/>
+          <p:cNvPicPr>
+            <a:picLocks noChangeAspect="1"/>
+          </p:cNvPicPr>
+          <p:nvPr/>
+        </p:nvPicPr>
+        <p:blipFill>
+          <a:blip r:embed="rId15">
+            <a:extLst>
+              <a:ext uri="{28A0092B-C50C-407E-A947-70E740481C1C}">
+                <a14:useLocalDpi xmlns:a14="http://schemas.microsoft.com/office/drawing/2010/main" val="0"/>
+              </a:ext>
+            </a:extLst>
+          </a:blip>
+          <a:stretch>
+            <a:fillRect/>
+          </a:stretch>
+        </p:blipFill>
+        <p:spPr>
+          <a:xfrm>
+            <a:off x="7532392" y="4691900"/>
+            <a:ext cx="2725148" cy="969348"/>
+          </a:xfrm>
+          <a:prstGeom prst="rect">
+            <a:avLst/>
+          </a:prstGeom>
+        </p:spPr>
+      </p:pic>
+      <p:pic>
+        <p:nvPicPr>
+          <p:cNvPr id="5" name="Picture 4"/>
+          <p:cNvPicPr>
+            <a:picLocks noChangeAspect="1"/>
+          </p:cNvPicPr>
+          <p:nvPr/>
+        </p:nvPicPr>
+        <p:blipFill>
+          <a:blip r:embed="rId16">
+            <a:extLst>
+              <a:ext uri="{28A0092B-C50C-407E-A947-70E740481C1C}">
+                <a14:useLocalDpi xmlns:a14="http://schemas.microsoft.com/office/drawing/2010/main" val="0"/>
+              </a:ext>
+            </a:extLst>
+          </a:blip>
+          <a:stretch>
+            <a:fillRect/>
+          </a:stretch>
+        </p:blipFill>
+        <p:spPr>
+          <a:xfrm>
+            <a:off x="7093005" y="3510530"/>
+            <a:ext cx="1566808" cy="1201016"/>
+          </a:xfrm>
+          <a:prstGeom prst="rect">
+            <a:avLst/>
+          </a:prstGeom>
+        </p:spPr>
+      </p:pic>
+      <p:pic>
+        <p:nvPicPr>
+          <p:cNvPr id="11" name="Picture 10"/>
+          <p:cNvPicPr>
+            <a:picLocks noChangeAspect="1"/>
+          </p:cNvPicPr>
+          <p:nvPr/>
+        </p:nvPicPr>
+        <p:blipFill>
+          <a:blip r:embed="rId17">
+            <a:extLst>
+              <a:ext uri="{28A0092B-C50C-407E-A947-70E740481C1C}">
+                <a14:useLocalDpi xmlns:a14="http://schemas.microsoft.com/office/drawing/2010/main" val="0"/>
+              </a:ext>
+            </a:extLst>
+          </a:blip>
+          <a:stretch>
+            <a:fillRect/>
+          </a:stretch>
+        </p:blipFill>
+        <p:spPr>
+          <a:xfrm>
+            <a:off x="5440846" y="4918125"/>
+            <a:ext cx="1652159" cy="1201016"/>
+          </a:xfrm>
+          <a:prstGeom prst="rect">
+            <a:avLst/>
+          </a:prstGeom>
+        </p:spPr>
+      </p:pic>
     </p:spTree>
     <p:extLst>
       <p:ext uri="{BB962C8B-B14F-4D97-AF65-F5344CB8AC3E}">
@@ -35340,11 +35692,11 @@
   <p:clrMapOvr>
     <a:masterClrMapping/>
   </p:clrMapOvr>
-  <mc:AlternateContent xmlns:mc="http://schemas.openxmlformats.org/markup-compatibility/2006">
-    <mc:Choice xmlns:p14="http://schemas.microsoft.com/office/powerpoint/2010/main" Requires="p14">
+  <mc:AlternateContent xmlns:mc="http://schemas.openxmlformats.org/markup-compatibility/2006" xmlns:p14="http://schemas.microsoft.com/office/powerpoint/2010/main">
+    <mc:Choice Requires="p14">
       <p:transition p14:dur="0"/>
     </mc:Choice>
-    <mc:Fallback>
+    <mc:Fallback xmlns="">
       <p:transition/>
     </mc:Fallback>
   </mc:AlternateContent>
@@ -35871,7 +36223,7 @@
                             </p:stCondLst>
                             <p:childTnLst>
                               <p:par>
-                                <p:cTn id="47" presetID="53" presetClass="entr" presetSubtype="16" fill="hold" grpId="0" nodeType="clickEffect">
+                                <p:cTn id="47" presetID="53" presetClass="entr" presetSubtype="16" fill="hold" nodeType="clickEffect">
                                   <p:stCondLst>
                                     <p:cond delay="0"/>
                                   </p:stCondLst>
@@ -35884,7 +36236,7 @@
                                           </p:stCondLst>
                                         </p:cTn>
                                         <p:tgtEl>
-                                          <p:spTgt spid="26"/>
+                                          <p:spTgt spid="5"/>
                                         </p:tgtEl>
                                         <p:attrNameLst>
                                           <p:attrName>style.visibility</p:attrName>
@@ -35898,7 +36250,7 @@
                                       <p:cBhvr>
                                         <p:cTn id="49" dur="500" fill="hold"/>
                                         <p:tgtEl>
-                                          <p:spTgt spid="26"/>
+                                          <p:spTgt spid="5"/>
                                         </p:tgtEl>
                                         <p:attrNameLst>
                                           <p:attrName>ppt_w</p:attrName>
@@ -35921,7 +36273,7 @@
                                       <p:cBhvr>
                                         <p:cTn id="50" dur="500" fill="hold"/>
                                         <p:tgtEl>
-                                          <p:spTgt spid="26"/>
+                                          <p:spTgt spid="5"/>
                                         </p:tgtEl>
                                         <p:attrNameLst>
                                           <p:attrName>ppt_h</p:attrName>
@@ -35944,7 +36296,7 @@
                                       <p:cBhvr>
                                         <p:cTn id="51" dur="500"/>
                                         <p:tgtEl>
-                                          <p:spTgt spid="26"/>
+                                          <p:spTgt spid="5"/>
                                         </p:tgtEl>
                                       </p:cBhvr>
                                     </p:animEffect>
@@ -36145,7 +36497,7 @@
                                 </p:cTn>
                               </p:par>
                               <p:par>
-                                <p:cTn id="69" presetID="53" presetClass="entr" presetSubtype="16" fill="hold" grpId="0" nodeType="withEffect">
+                                <p:cTn id="69" presetID="53" presetClass="entr" presetSubtype="16" fill="hold" nodeType="withEffect">
                                   <p:stCondLst>
                                     <p:cond delay="0"/>
                                   </p:stCondLst>
@@ -36158,7 +36510,7 @@
                                           </p:stCondLst>
                                         </p:cTn>
                                         <p:tgtEl>
-                                          <p:spTgt spid="35"/>
+                                          <p:spTgt spid="11"/>
                                         </p:tgtEl>
                                         <p:attrNameLst>
                                           <p:attrName>style.visibility</p:attrName>
@@ -36172,7 +36524,7 @@
                                       <p:cBhvr>
                                         <p:cTn id="71" dur="500" fill="hold"/>
                                         <p:tgtEl>
-                                          <p:spTgt spid="35"/>
+                                          <p:spTgt spid="11"/>
                                         </p:tgtEl>
                                         <p:attrNameLst>
                                           <p:attrName>ppt_w</p:attrName>
@@ -36195,7 +36547,7 @@
                                       <p:cBhvr>
                                         <p:cTn id="72" dur="500" fill="hold"/>
                                         <p:tgtEl>
-                                          <p:spTgt spid="35"/>
+                                          <p:spTgt spid="11"/>
                                         </p:tgtEl>
                                         <p:attrNameLst>
                                           <p:attrName>ppt_h</p:attrName>
@@ -36218,7 +36570,7 @@
                                       <p:cBhvr>
                                         <p:cTn id="73" dur="500"/>
                                         <p:tgtEl>
-                                          <p:spTgt spid="35"/>
+                                          <p:spTgt spid="11"/>
                                         </p:tgtEl>
                                       </p:cBhvr>
                                     </p:animEffect>
@@ -36489,7 +36841,7 @@
                                 </p:cTn>
                               </p:par>
                               <p:par>
-                                <p:cTn id="97" presetID="53" presetClass="entr" presetSubtype="16" fill="hold" grpId="0" nodeType="withEffect">
+                                <p:cTn id="97" presetID="53" presetClass="entr" presetSubtype="16" fill="hold" nodeType="withEffect">
                                   <p:stCondLst>
                                     <p:cond delay="0"/>
                                   </p:stCondLst>
@@ -36502,7 +36854,7 @@
                                           </p:stCondLst>
                                         </p:cTn>
                                         <p:tgtEl>
-                                          <p:spTgt spid="38"/>
+                                          <p:spTgt spid="4"/>
                                         </p:tgtEl>
                                         <p:attrNameLst>
                                           <p:attrName>style.visibility</p:attrName>
@@ -36516,7 +36868,7 @@
                                       <p:cBhvr>
                                         <p:cTn id="99" dur="500" fill="hold"/>
                                         <p:tgtEl>
-                                          <p:spTgt spid="38"/>
+                                          <p:spTgt spid="4"/>
                                         </p:tgtEl>
                                         <p:attrNameLst>
                                           <p:attrName>ppt_w</p:attrName>
@@ -36539,7 +36891,7 @@
                                       <p:cBhvr>
                                         <p:cTn id="100" dur="500" fill="hold"/>
                                         <p:tgtEl>
-                                          <p:spTgt spid="38"/>
+                                          <p:spTgt spid="4"/>
                                         </p:tgtEl>
                                         <p:attrNameLst>
                                           <p:attrName>ppt_h</p:attrName>
@@ -36562,7 +36914,7 @@
                                       <p:cBhvr>
                                         <p:cTn id="101" dur="500"/>
                                         <p:tgtEl>
-                                          <p:spTgt spid="38"/>
+                                          <p:spTgt spid="4"/>
                                         </p:tgtEl>
                                       </p:cBhvr>
                                     </p:animEffect>
@@ -36745,14 +37097,11 @@
       <p:bldP spid="17" grpId="0"/>
       <p:bldP spid="20" grpId="0"/>
       <p:bldP spid="24" grpId="0" animBg="1"/>
-      <p:bldP spid="26" grpId="0"/>
       <p:bldP spid="27" grpId="0"/>
       <p:bldP spid="28" grpId="0" animBg="1"/>
       <p:bldP spid="33" grpId="0"/>
       <p:bldP spid="34" grpId="0"/>
-      <p:bldP spid="35" grpId="0"/>
       <p:bldP spid="37" grpId="0" animBg="1"/>
-      <p:bldP spid="38" grpId="0"/>
       <p:bldP spid="39" grpId="0"/>
       <p:bldP spid="40" grpId="0"/>
       <p:bldP spid="41" grpId="0"/>
@@ -36981,14 +37330,6 @@
               </a:rPr>
               <a:t>WEB</a:t>
             </a:r>
-            <a:endParaRPr lang="es-AR" sz="4949" spc="-113" dirty="0">
-              <a:solidFill>
-                <a:srgbClr val="00B0F0"/>
-              </a:solidFill>
-              <a:latin typeface="Kozuka Gothic Pro B" panose="020B0800000000000000" pitchFamily="34" charset="-128"/>
-              <a:ea typeface="Kozuka Gothic Pro B" panose="020B0800000000000000" pitchFamily="34" charset="-128"/>
-              <a:cs typeface="Mongolian Baiti" panose="03000500000000000000" pitchFamily="66" charset="0"/>
-            </a:endParaRPr>
           </a:p>
         </p:txBody>
       </p:sp>
@@ -37232,13 +37573,6 @@
               </a:rPr>
               <a:t>Y LAPTOPS</a:t>
             </a:r>
-            <a:endParaRPr lang="es-AR" sz="1500" b="1" dirty="0">
-              <a:solidFill>
-                <a:srgbClr val="00B0F0"/>
-              </a:solidFill>
-              <a:latin typeface="Gulim" panose="020B0600000101010101" pitchFamily="34" charset="-127"/>
-              <a:ea typeface="Gulim" panose="020B0600000101010101" pitchFamily="34" charset="-127"/>
-            </a:endParaRPr>
           </a:p>
         </p:txBody>
       </p:sp>
@@ -37310,15 +37644,6 @@
               </a:rPr>
               <a:t>sl</a:t>
             </a:r>
-            <a:endParaRPr lang="es-AR" sz="2700" dirty="0">
-              <a:solidFill>
-                <a:schemeClr val="bg1">
-                  <a:lumMod val="65000"/>
-                </a:schemeClr>
-              </a:solidFill>
-              <a:latin typeface="Kozuka Gothic Pro B" panose="020B0800000000000000" pitchFamily="34" charset="-128"/>
-              <a:ea typeface="Kozuka Gothic Pro B" panose="020B0800000000000000" pitchFamily="34" charset="-128"/>
-            </a:endParaRPr>
           </a:p>
         </p:txBody>
       </p:sp>
@@ -37436,14 +37761,6 @@
               </a:rPr>
               <a:t>MOBILE</a:t>
             </a:r>
-            <a:endParaRPr lang="es-AR" sz="4949" spc="-113" dirty="0">
-              <a:solidFill>
-                <a:srgbClr val="00B0F0"/>
-              </a:solidFill>
-              <a:latin typeface="Kozuka Gothic Pro B" panose="020B0800000000000000" pitchFamily="34" charset="-128"/>
-              <a:ea typeface="Kozuka Gothic Pro B" panose="020B0800000000000000" pitchFamily="34" charset="-128"/>
-              <a:cs typeface="Mongolian Baiti" panose="03000500000000000000" pitchFamily="66" charset="0"/>
-            </a:endParaRPr>
           </a:p>
         </p:txBody>
       </p:sp>
@@ -37723,14 +38040,6 @@
               </a:rPr>
               <a:t>APLICACIONES</a:t>
             </a:r>
-            <a:endParaRPr lang="es-AR" sz="4499" spc="-113" dirty="0">
-              <a:solidFill>
-                <a:srgbClr val="00B0F0"/>
-              </a:solidFill>
-              <a:latin typeface="Kozuka Gothic Pro B" panose="020B0800000000000000" pitchFamily="34" charset="-128"/>
-              <a:ea typeface="Kozuka Gothic Pro B" panose="020B0800000000000000" pitchFamily="34" charset="-128"/>
-              <a:cs typeface="Mongolian Baiti" panose="03000500000000000000" pitchFamily="66" charset="0"/>
-            </a:endParaRPr>
           </a:p>
         </p:txBody>
       </p:sp>
@@ -38361,14 +38670,6 @@
               </a:rPr>
               <a:t>VIDEO</a:t>
             </a:r>
-            <a:endParaRPr lang="es-AR" sz="3300" dirty="0">
-              <a:solidFill>
-                <a:srgbClr val="00B0F0"/>
-              </a:solidFill>
-              <a:latin typeface="Kozuka Gothic Pro B" panose="020B0800000000000000" pitchFamily="34" charset="-128"/>
-              <a:ea typeface="Kozuka Gothic Pro B" panose="020B0800000000000000" pitchFamily="34" charset="-128"/>
-              <a:cs typeface="Mongolian Baiti" panose="03000500000000000000" pitchFamily="66" charset="0"/>
-            </a:endParaRPr>
           </a:p>
         </p:txBody>
       </p:sp>
@@ -38609,11 +38910,11 @@
   <p:clrMapOvr>
     <a:masterClrMapping/>
   </p:clrMapOvr>
-  <mc:AlternateContent xmlns:mc="http://schemas.openxmlformats.org/markup-compatibility/2006">
-    <mc:Choice xmlns:p14="http://schemas.microsoft.com/office/powerpoint/2010/main" Requires="p14">
+  <mc:AlternateContent xmlns:mc="http://schemas.openxmlformats.org/markup-compatibility/2006" xmlns:p14="http://schemas.microsoft.com/office/powerpoint/2010/main">
+    <mc:Choice Requires="p14">
       <p:transition p14:dur="0"/>
     </mc:Choice>
-    <mc:Fallback>
+    <mc:Fallback xmlns="">
       <p:transition/>
     </mc:Fallback>
   </mc:AlternateContent>
@@ -40008,10 +40309,6 @@
               </a:rPr>
               <a:t>agnóstico del formato</a:t>
             </a:r>
-            <a:endParaRPr lang="es-AR" sz="2000" dirty="0">
-              <a:latin typeface="+mj-lt"/>
-              <a:ea typeface="Gulim" panose="020B0600000101010101" pitchFamily="34" charset="-127"/>
-            </a:endParaRPr>
           </a:p>
         </p:txBody>
       </p:sp>
@@ -40200,13 +40497,7 @@
               <a:rPr lang="en-US" sz="1350" dirty="0">
                 <a:ea typeface="Gulim" panose="020B0600000101010101" pitchFamily="34" charset="-127"/>
               </a:rPr>
-              <a:t>Apple </a:t>
-            </a:r>
-            <a:r>
-              <a:rPr lang="en-US" sz="1350" dirty="0">
-                <a:ea typeface="Gulim" panose="020B0600000101010101" pitchFamily="34" charset="-127"/>
-              </a:rPr>
-              <a:t>HTTP Live Streaming</a:t>
+              <a:t>Apple HTTP Live Streaming</a:t>
             </a:r>
           </a:p>
           <a:p>
@@ -40215,13 +40506,7 @@
               <a:rPr lang="en-US" sz="1350" dirty="0">
                 <a:ea typeface="Gulim" panose="020B0600000101010101" pitchFamily="34" charset="-127"/>
               </a:rPr>
-              <a:t>Progressive </a:t>
-            </a:r>
-            <a:r>
-              <a:rPr lang="en-US" sz="1350" dirty="0">
-                <a:ea typeface="Gulim" panose="020B0600000101010101" pitchFamily="34" charset="-127"/>
-              </a:rPr>
-              <a:t>Download</a:t>
+              <a:t>Progressive Download</a:t>
             </a:r>
           </a:p>
           <a:p>
@@ -40229,13 +40514,7 @@
               <a:rPr lang="en-US" sz="1350" dirty="0">
                 <a:ea typeface="Gulim" panose="020B0600000101010101" pitchFamily="34" charset="-127"/>
               </a:rPr>
-              <a:t>Flash HTTP Dynamic Streaming</a:t>
-            </a:r>
-            <a:r>
-              <a:rPr lang="en-US" sz="1350" dirty="0">
-                <a:ea typeface="Gulim" panose="020B0600000101010101" pitchFamily="34" charset="-127"/>
-              </a:rPr>
-              <a:t> </a:t>
+              <a:t>Flash HTTP Dynamic Streaming </a:t>
             </a:r>
             <a:r>
               <a:rPr lang="en-US" sz="1350" i="1" dirty="0">
@@ -40349,10 +40628,6 @@
               </a:rPr>
               <a:t>agnóstico del protocolo</a:t>
             </a:r>
-            <a:endParaRPr lang="es-AR" sz="2000" dirty="0">
-              <a:latin typeface="+mj-lt"/>
-              <a:ea typeface="Gulim" panose="020B0600000101010101" pitchFamily="34" charset="-127"/>
-            </a:endParaRPr>
           </a:p>
         </p:txBody>
       </p:sp>
@@ -40538,9 +40813,6 @@
               </a:rPr>
               <a:t>(roadmap)</a:t>
             </a:r>
-            <a:endParaRPr lang="en-US" sz="1350" i="1" dirty="0">
-              <a:ea typeface="Gulim" panose="020B0600000101010101" pitchFamily="34" charset="-127"/>
-            </a:endParaRPr>
           </a:p>
         </p:txBody>
       </p:sp>
@@ -40582,10 +40854,6 @@
               </a:rPr>
               <a:t>agnóstico de DRM</a:t>
             </a:r>
-            <a:endParaRPr lang="es-AR" sz="2000" dirty="0">
-              <a:latin typeface="+mj-lt"/>
-              <a:ea typeface="Gulim" panose="020B0600000101010101" pitchFamily="34" charset="-127"/>
-            </a:endParaRPr>
           </a:p>
         </p:txBody>
       </p:sp>
@@ -40763,13 +41031,7 @@
               <a:rPr lang="en-US" sz="1350" dirty="0">
                 <a:ea typeface="Gulim" panose="020B0600000101010101" pitchFamily="34" charset="-127"/>
               </a:rPr>
-              <a:t>Adobe </a:t>
-            </a:r>
-            <a:r>
-              <a:rPr lang="en-US" sz="1350" dirty="0">
-                <a:ea typeface="Gulim" panose="020B0600000101010101" pitchFamily="34" charset="-127"/>
-              </a:rPr>
-              <a:t>Access </a:t>
+              <a:t>Adobe Access </a:t>
             </a:r>
             <a:r>
               <a:rPr lang="en-US" sz="1350" i="1" dirty="0">
@@ -40789,9 +41051,6 @@
               </a:rPr>
               <a:t>)</a:t>
             </a:r>
-            <a:endParaRPr lang="en-US" sz="1350" i="1" dirty="0">
-              <a:ea typeface="Gulim" panose="020B0600000101010101" pitchFamily="34" charset="-127"/>
-            </a:endParaRPr>
           </a:p>
         </p:txBody>
       </p:sp>
@@ -41391,12 +41650,6 @@
               </a:rPr>
               <a:t>En cualquier lugar y en cualquier momento</a:t>
             </a:r>
-            <a:endParaRPr lang="es-AR" sz="1150" b="1" dirty="0">
-              <a:solidFill>
-                <a:srgbClr val="00B0F0"/>
-              </a:solidFill>
-              <a:latin typeface="+mn-lt"/>
-            </a:endParaRPr>
           </a:p>
         </p:txBody>
       </p:sp>
@@ -41454,9 +41707,6 @@
               </a:rPr>
               <a:t>con el mejor formato, protocolo y DRM posible</a:t>
             </a:r>
-            <a:endParaRPr lang="es-AR" sz="2400" dirty="0">
-              <a:ea typeface="Gulim" panose="020B0600000101010101" pitchFamily="34" charset="-127"/>
-            </a:endParaRPr>
           </a:p>
         </p:txBody>
       </p:sp>
@@ -41470,11 +41720,11 @@
   <p:clrMapOvr>
     <a:masterClrMapping/>
   </p:clrMapOvr>
-  <mc:AlternateContent xmlns:mc="http://schemas.openxmlformats.org/markup-compatibility/2006">
-    <mc:Choice xmlns:p14="http://schemas.microsoft.com/office/powerpoint/2010/main" Requires="p14">
+  <mc:AlternateContent xmlns:mc="http://schemas.openxmlformats.org/markup-compatibility/2006" xmlns:p14="http://schemas.microsoft.com/office/powerpoint/2010/main">
+    <mc:Choice Requires="p14">
       <p:transition p14:dur="0"/>
     </mc:Choice>
-    <mc:Fallback>
+    <mc:Fallback xmlns="">
       <p:transition/>
     </mc:Fallback>
   </mc:AlternateContent>
@@ -42817,13 +43067,6 @@
               </a:rPr>
               <a:t>Flash</a:t>
             </a:r>
-            <a:endParaRPr lang="en-US" b="1" dirty="0">
-              <a:solidFill>
-                <a:schemeClr val="tx1"/>
-              </a:solidFill>
-              <a:latin typeface="Gulim" panose="020B0600000101010101" pitchFamily="34" charset="-127"/>
-              <a:ea typeface="Gulim" panose="020B0600000101010101" pitchFamily="34" charset="-127"/>
-            </a:endParaRPr>
           </a:p>
         </p:txBody>
       </p:sp>
@@ -42853,13 +43096,7 @@
               <a:rPr lang="en-US" sz="1600" dirty="0">
                 <a:hlinkClick r:id="rId4"/>
               </a:rPr>
-              <a:t>OSMF </a:t>
-            </a:r>
-            <a:r>
-              <a:rPr lang="en-US" sz="1600" dirty="0">
-                <a:hlinkClick r:id="rId4"/>
-              </a:rPr>
-              <a:t>plugin for smooth streaming</a:t>
+              <a:t>OSMF plugin for smooth streaming</a:t>
             </a:r>
             <a:endParaRPr lang="en-US" sz="1600" dirty="0"/>
           </a:p>
@@ -43071,15 +43308,6 @@
               </a:rPr>
               <a:t>APPS</a:t>
             </a:r>
-            <a:endParaRPr lang="en-US" sz="3200" b="1" dirty="0">
-              <a:solidFill>
-                <a:schemeClr val="tx2">
-                  <a:lumMod val="50000"/>
-                </a:schemeClr>
-              </a:solidFill>
-              <a:latin typeface="Gulim" panose="020B0600000101010101" pitchFamily="34" charset="-127"/>
-              <a:ea typeface="Gulim" panose="020B0600000101010101" pitchFamily="34" charset="-127"/>
-            </a:endParaRPr>
           </a:p>
         </p:txBody>
       </p:sp>
@@ -43247,13 +43475,7 @@
               <a:rPr lang="en-US" sz="1600" dirty="0">
                 <a:hlinkClick r:id="rId6"/>
               </a:rPr>
-              <a:t>Smooth Streaming Player </a:t>
-            </a:r>
-            <a:r>
-              <a:rPr lang="en-US" sz="1600" dirty="0">
-                <a:hlinkClick r:id="rId6"/>
-              </a:rPr>
-              <a:t>Framework</a:t>
+              <a:t>Smooth Streaming Player Framework</a:t>
             </a:r>
             <a:endParaRPr lang="en-US" sz="1600" dirty="0"/>
           </a:p>
@@ -43263,13 +43485,7 @@
               <a:rPr lang="en-US" sz="1600" dirty="0">
                 <a:hlinkClick r:id="rId7"/>
               </a:rPr>
-              <a:t>Smooth Streaming Client </a:t>
-            </a:r>
-            <a:r>
-              <a:rPr lang="en-US" sz="1600" dirty="0">
-                <a:hlinkClick r:id="rId7"/>
-              </a:rPr>
-              <a:t>SDK</a:t>
+              <a:t>Smooth Streaming Client SDK</a:t>
             </a:r>
             <a:endParaRPr lang="en-US" sz="1600" dirty="0"/>
           </a:p>
@@ -43369,13 +43585,7 @@
               <a:rPr lang="en-US" sz="1600" dirty="0">
                 <a:hlinkClick r:id="rId8"/>
               </a:rPr>
-              <a:t>Smooth Streaming Player </a:t>
-            </a:r>
-            <a:r>
-              <a:rPr lang="en-US" sz="1600" dirty="0">
-                <a:hlinkClick r:id="rId8"/>
-              </a:rPr>
-              <a:t>Framework</a:t>
+              <a:t>Smooth Streaming Player Framework</a:t>
             </a:r>
             <a:endParaRPr lang="en-US" sz="1600" dirty="0"/>
           </a:p>
@@ -43385,13 +43595,7 @@
               <a:rPr lang="en-US" sz="1600" dirty="0">
                 <a:hlinkClick r:id="rId8"/>
               </a:rPr>
-              <a:t>Smooth Streaming Client </a:t>
-            </a:r>
-            <a:r>
-              <a:rPr lang="en-US" sz="1600" dirty="0">
-                <a:hlinkClick r:id="rId8"/>
-              </a:rPr>
-              <a:t>SDK</a:t>
+              <a:t>Smooth Streaming Client SDK</a:t>
             </a:r>
             <a:endParaRPr lang="en-US" sz="1600" dirty="0"/>
           </a:p>
@@ -43610,15 +43814,6 @@
               </a:rPr>
               <a:t>MOBILE</a:t>
             </a:r>
-            <a:endParaRPr lang="en-US" sz="2400" b="1" dirty="0">
-              <a:solidFill>
-                <a:schemeClr val="tx2">
-                  <a:lumMod val="50000"/>
-                </a:schemeClr>
-              </a:solidFill>
-              <a:latin typeface="Gulim" panose="020B0600000101010101" pitchFamily="34" charset="-127"/>
-              <a:ea typeface="Gulim" panose="020B0600000101010101" pitchFamily="34" charset="-127"/>
-            </a:endParaRPr>
           </a:p>
         </p:txBody>
       </p:sp>
@@ -43757,13 +43952,6 @@
               </a:rPr>
               <a:t>WinPhone</a:t>
             </a:r>
-            <a:endParaRPr lang="en-US" b="1" dirty="0">
-              <a:solidFill>
-                <a:schemeClr val="tx1"/>
-              </a:solidFill>
-              <a:latin typeface="Gulim" panose="020B0600000101010101" pitchFamily="34" charset="-127"/>
-              <a:ea typeface="Gulim" panose="020B0600000101010101" pitchFamily="34" charset="-127"/>
-            </a:endParaRPr>
           </a:p>
         </p:txBody>
       </p:sp>
@@ -43793,19 +43981,7 @@
               <a:rPr lang="en-US" sz="1600" dirty="0">
                 <a:hlinkClick r:id="rId10"/>
               </a:rPr>
-              <a:t>Player Framework for </a:t>
-            </a:r>
-            <a:r>
-              <a:rPr lang="en-US" sz="1600" dirty="0">
-                <a:hlinkClick r:id="rId10"/>
-              </a:rPr>
-              <a:t>WinPhone </a:t>
-            </a:r>
-            <a:r>
-              <a:rPr lang="en-US" sz="1600" dirty="0">
-                <a:hlinkClick r:id="rId10"/>
-              </a:rPr>
-              <a:t>8</a:t>
+              <a:t>Player Framework for WinPhone 8</a:t>
             </a:r>
             <a:endParaRPr lang="en-US" sz="1600" dirty="0"/>
           </a:p>
@@ -43815,13 +43991,7 @@
               <a:rPr lang="en-US" sz="1600" dirty="0">
                 <a:hlinkClick r:id="rId3"/>
               </a:rPr>
-              <a:t>Smooth Streaming Client </a:t>
-            </a:r>
-            <a:r>
-              <a:rPr lang="en-US" sz="1600" dirty="0">
-                <a:hlinkClick r:id="rId3"/>
-              </a:rPr>
-              <a:t>SDK</a:t>
+              <a:t>Smooth Streaming Client SDK</a:t>
             </a:r>
             <a:endParaRPr lang="en-US" sz="1600" dirty="0"/>
           </a:p>
@@ -43919,15 +44089,7 @@
             <a:pPr lvl="0"/>
             <a:r>
               <a:rPr lang="en-US" sz="1600" dirty="0"/>
-              <a:t>Partner SDKs </a:t>
-            </a:r>
-            <a:r>
-              <a:rPr lang="en-US" sz="1600" dirty="0"/>
-              <a:t>and </a:t>
-            </a:r>
-            <a:r>
-              <a:rPr lang="en-US" sz="1600" dirty="0"/>
-              <a:t>Frameworks</a:t>
+              <a:t>Partner SDKs and Frameworks</a:t>
             </a:r>
           </a:p>
           <a:p>
@@ -43935,13 +44097,7 @@
               <a:rPr lang="en-US" sz="1600" dirty="0">
                 <a:hlinkClick r:id="rId4"/>
               </a:rPr>
-              <a:t>OSMF plugin for smooth </a:t>
-            </a:r>
-            <a:r>
-              <a:rPr lang="en-US" sz="1600" dirty="0">
-                <a:hlinkClick r:id="rId4"/>
-              </a:rPr>
-              <a:t>streaming</a:t>
+              <a:t>OSMF plugin for smooth streaming</a:t>
             </a:r>
             <a:endParaRPr lang="en-US" sz="1600" dirty="0"/>
           </a:p>
@@ -44048,19 +44204,7 @@
               <a:rPr lang="en-US" sz="1600" dirty="0">
                 <a:hlinkClick r:id="rId9"/>
               </a:rPr>
-              <a:t>Player </a:t>
-            </a:r>
-            <a:r>
-              <a:rPr lang="en-US" sz="1600" dirty="0">
-                <a:hlinkClick r:id="rId9"/>
-              </a:rPr>
-              <a:t>Framework </a:t>
-            </a:r>
-            <a:r>
-              <a:rPr lang="en-US" sz="1600" dirty="0">
-                <a:hlinkClick r:id="rId9"/>
-              </a:rPr>
-              <a:t>for smooth streaming with PlayReady</a:t>
+              <a:t>Player Framework for smooth streaming with PlayReady</a:t>
             </a:r>
             <a:endParaRPr lang="en-US" sz="1600" dirty="0"/>
           </a:p>
@@ -44070,13 +44214,7 @@
               <a:rPr lang="en-US" sz="1600" dirty="0">
                 <a:hlinkClick r:id="rId11"/>
               </a:rPr>
-              <a:t>Player Framework for </a:t>
-            </a:r>
-            <a:r>
-              <a:rPr lang="en-US" sz="1600" dirty="0">
-                <a:hlinkClick r:id="rId11"/>
-              </a:rPr>
-              <a:t>HLS</a:t>
+              <a:t>Player Framework for HLS</a:t>
             </a:r>
             <a:endParaRPr lang="en-US" sz="1600" dirty="0"/>
           </a:p>
@@ -45344,11 +45482,11 @@
   <p:clrMapOvr>
     <a:masterClrMapping/>
   </p:clrMapOvr>
-  <mc:AlternateContent xmlns:mc="http://schemas.openxmlformats.org/markup-compatibility/2006">
-    <mc:Choice xmlns:p14="http://schemas.microsoft.com/office/powerpoint/2010/main" Requires="p14">
+  <mc:AlternateContent xmlns:mc="http://schemas.openxmlformats.org/markup-compatibility/2006" xmlns:p14="http://schemas.microsoft.com/office/powerpoint/2010/main">
+    <mc:Choice Requires="p14">
       <p:transition p14:dur="0"/>
     </mc:Choice>
-    <mc:Fallback>
+    <mc:Fallback xmlns="">
       <p:transition/>
     </mc:Fallback>
   </mc:AlternateContent>
@@ -47685,25 +47823,6 @@
               </a:rPr>
               <a:t>Múltiples formatos, múltiples bitrates</a:t>
             </a:r>
-            <a:endParaRPr lang="es-AR" sz="1500" dirty="0">
-              <a:gradFill>
-                <a:gsLst>
-                  <a:gs pos="0">
-                    <a:srgbClr val="292929">
-                      <a:lumMod val="90000"/>
-                      <a:lumOff val="10000"/>
-                    </a:srgbClr>
-                  </a:gs>
-                  <a:gs pos="86000">
-                    <a:srgbClr val="292929">
-                      <a:lumMod val="90000"/>
-                      <a:lumOff val="10000"/>
-                    </a:srgbClr>
-                  </a:gs>
-                </a:gsLst>
-                <a:lin ang="5400000" scaled="0"/>
-              </a:gradFill>
-            </a:endParaRPr>
           </a:p>
         </p:txBody>
       </p:sp>
@@ -47763,12 +47882,6 @@
               </a:rPr>
               <a:t>En cualquier lugar y en cualquier momento</a:t>
             </a:r>
-            <a:endParaRPr lang="es-AR" sz="1150" b="1" dirty="0">
-              <a:solidFill>
-                <a:srgbClr val="00B0F0"/>
-              </a:solidFill>
-              <a:latin typeface="+mn-lt"/>
-            </a:endParaRPr>
           </a:p>
         </p:txBody>
       </p:sp>
@@ -48317,11 +48430,11 @@
   <p:clrMapOvr>
     <a:masterClrMapping/>
   </p:clrMapOvr>
-  <mc:AlternateContent xmlns:mc="http://schemas.openxmlformats.org/markup-compatibility/2006">
-    <mc:Choice xmlns:p14="http://schemas.microsoft.com/office/powerpoint/2010/main" Requires="p14">
+  <mc:AlternateContent xmlns:mc="http://schemas.openxmlformats.org/markup-compatibility/2006" xmlns:p14="http://schemas.microsoft.com/office/powerpoint/2010/main">
+    <mc:Choice Requires="p14">
       <p:transition p14:dur="0"/>
     </mc:Choice>
-    <mc:Fallback>
+    <mc:Fallback xmlns="">
       <p:transition/>
     </mc:Fallback>
   </mc:AlternateContent>
@@ -48842,7 +48955,7 @@
           <a:graphicData uri="http://schemas.openxmlformats.org/presentationml/2006/ole">
             <mc:AlternateContent xmlns:mc="http://schemas.openxmlformats.org/markup-compatibility/2006">
               <mc:Choice xmlns:v="urn:schemas-microsoft-com:vml" Requires="v">
-                <p:oleObj spid="_x0000_s1163" name="think-cell Slide" r:id="rId7" imgW="360" imgH="360" progId="">
+                <p:oleObj spid="_x0000_s1178" name="think-cell Slide" r:id="rId7" imgW="360" imgH="360" progId="">
                   <p:embed/>
                 </p:oleObj>
               </mc:Choice>
@@ -49938,12 +50051,6 @@
               </a:rPr>
               <a:t>Soporte para subir archivos masivamente</a:t>
             </a:r>
-            <a:endParaRPr lang="es-AR" sz="1500" b="1" dirty="0">
-              <a:solidFill>
-                <a:schemeClr val="bg1"/>
-              </a:solidFill>
-              <a:latin typeface="+mj-lt"/>
-            </a:endParaRPr>
           </a:p>
         </p:txBody>
       </p:sp>
@@ -50049,13 +50156,6 @@
                 </a:rPr>
                 <a:t>Ingestion</a:t>
               </a:r>
-              <a:endParaRPr lang="en-US" sz="1200" dirty="0">
-                <a:solidFill>
-                  <a:schemeClr val="bg1">
-                    <a:alpha val="99000"/>
-                  </a:schemeClr>
-                </a:solidFill>
-              </a:endParaRPr>
             </a:p>
           </p:txBody>
         </p:sp>
@@ -50070,11 +50170,11 @@
   <p:clrMapOvr>
     <a:masterClrMapping/>
   </p:clrMapOvr>
-  <mc:AlternateContent xmlns:mc="http://schemas.openxmlformats.org/markup-compatibility/2006">
-    <mc:Choice xmlns:p14="http://schemas.microsoft.com/office/powerpoint/2010/main" Requires="p14">
+  <mc:AlternateContent xmlns:mc="http://schemas.openxmlformats.org/markup-compatibility/2006" xmlns:p14="http://schemas.microsoft.com/office/powerpoint/2010/main">
+    <mc:Choice Requires="p14">
       <p:transition p14:dur="0"/>
     </mc:Choice>
-    <mc:Fallback>
+    <mc:Fallback xmlns="">
       <p:transition/>
     </mc:Fallback>
   </mc:AlternateContent>
@@ -51220,13 +51320,13 @@
 
 <file path=customXml/item3.xml><?xml version="1.0" encoding="utf-8"?>
 <Control xmlns="http://schemas.microsoft.com/VisualStudio/2011/storyboarding/control">
-  <Id Name="System.Storyboarding.Icons.Calendar" RevisionId="05cd6d03-c0b2-488e-98a7-d68de69a2cfc" Stencil="System.Storyboarding.Icons" StencilRevisionId="05cd6d03-c0b2-488e-98a7-d68de69a2cfc" StencilVersion="0.1"/>
+  <Id Name="1926977f-ddea-40cd-8909-7dad74082de4" RevisionId="80850475-a21a-4b30-a662-27aac04ef11c" Stencil="48ab8805-b199-4546-a652-7582788c988d" StencilRevisionId="00000000-0000-0000-0000-000000000000" StencilVersion="0.0"/>
 </Control>
 </file>
 
 <file path=customXml/item4.xml><?xml version="1.0" encoding="utf-8"?>
 <Control xmlns="http://schemas.microsoft.com/VisualStudio/2011/storyboarding/control">
-  <Id Name="1926977f-ddea-40cd-8909-7dad74082de4" RevisionId="80850475-a21a-4b30-a662-27aac04ef11c" Stencil="48ab8805-b199-4546-a652-7582788c988d" StencilRevisionId="00000000-0000-0000-0000-000000000000" StencilVersion="0.0"/>
+  <Id Name="System.Storyboarding.Icons.WiFi" RevisionId="05cd6d03-c0b2-488e-98a7-d68de69a2cfc" Stencil="System.Storyboarding.Icons" StencilRevisionId="05cd6d03-c0b2-488e-98a7-d68de69a2cfc" StencilVersion="0.1"/>
 </Control>
 </file>
 
@@ -51238,18 +51338,18 @@
 
 <file path=customXml/item6.xml><?xml version="1.0" encoding="utf-8"?>
 <Control xmlns="http://schemas.microsoft.com/VisualStudio/2011/storyboarding/control">
-  <Id Name="System.Storyboarding.Icons.WiFi" RevisionId="05cd6d03-c0b2-488e-98a7-d68de69a2cfc" Stencil="System.Storyboarding.Icons" StencilRevisionId="05cd6d03-c0b2-488e-98a7-d68de69a2cfc" StencilVersion="0.1"/>
+  <Id Name="1926977f-ddea-40cd-8909-7dad74082de4" RevisionId="80850475-a21a-4b30-a662-27aac04ef11c" Stencil="48ab8805-b199-4546-a652-7582788c988d" StencilRevisionId="00000000-0000-0000-0000-000000000000" StencilVersion="0.0"/>
 </Control>
 </file>
 
 <file path=customXml/item7.xml><?xml version="1.0" encoding="utf-8"?>
 <Control xmlns="http://schemas.microsoft.com/VisualStudio/2011/storyboarding/control">
-  <Id Name="1926977f-ddea-40cd-8909-7dad74082de4" RevisionId="80850475-a21a-4b30-a662-27aac04ef11c" Stencil="48ab8805-b199-4546-a652-7582788c988d" StencilRevisionId="00000000-0000-0000-0000-000000000000" StencilVersion="0.0"/>
+  <Id Name="System.Storyboarding.Icons.Calendar" RevisionId="05cd6d03-c0b2-488e-98a7-d68de69a2cfc" Stencil="System.Storyboarding.Icons" StencilRevisionId="05cd6d03-c0b2-488e-98a7-d68de69a2cfc" StencilVersion="0.1"/>
 </Control>
 </file>
 
 <file path=customXml/itemProps1.xml><?xml version="1.0" encoding="utf-8"?>
-<ds:datastoreItem xmlns:ds="http://schemas.openxmlformats.org/officeDocument/2006/customXml" ds:itemID="{7C02861A-927D-43AD-9F4D-F91F9940836C}">
+<ds:datastoreItem xmlns:ds="http://schemas.openxmlformats.org/officeDocument/2006/customXml" ds:itemID="{237EF1E1-8A22-40D2-8C34-536459112B06}">
   <ds:schemaRefs>
     <ds:schemaRef ds:uri="http://schemas.microsoft.com/VisualStudio/2011/storyboarding/control"/>
   </ds:schemaRefs>
@@ -51265,7 +51365,7 @@
 </file>
 
 <file path=customXml/itemProps3.xml><?xml version="1.0" encoding="utf-8"?>
-<ds:datastoreItem xmlns:ds="http://schemas.openxmlformats.org/officeDocument/2006/customXml" ds:itemID="{11AB441A-2E45-4B1C-9012-250459F32BE9}">
+<ds:datastoreItem xmlns:ds="http://schemas.openxmlformats.org/officeDocument/2006/customXml" ds:itemID="{7C02861A-927D-43AD-9F4D-F91F9940836C}">
   <ds:schemaRefs>
     <ds:schemaRef ds:uri="http://schemas.microsoft.com/VisualStudio/2011/storyboarding/control"/>
   </ds:schemaRefs>
@@ -51273,7 +51373,7 @@
 </file>
 
 <file path=customXml/itemProps4.xml><?xml version="1.0" encoding="utf-8"?>
-<ds:datastoreItem xmlns:ds="http://schemas.openxmlformats.org/officeDocument/2006/customXml" ds:itemID="{841B9029-2A9E-4B70-8892-A68EFAAABBD2}">
+<ds:datastoreItem xmlns:ds="http://schemas.openxmlformats.org/officeDocument/2006/customXml" ds:itemID="{EE60156C-2B7F-42C4-9B2A-A12956B85819}">
   <ds:schemaRefs>
     <ds:schemaRef ds:uri="http://schemas.microsoft.com/VisualStudio/2011/storyboarding/control"/>
   </ds:schemaRefs>
@@ -51289,7 +51389,7 @@
 </file>
 
 <file path=customXml/itemProps6.xml><?xml version="1.0" encoding="utf-8"?>
-<ds:datastoreItem xmlns:ds="http://schemas.openxmlformats.org/officeDocument/2006/customXml" ds:itemID="{EE60156C-2B7F-42C4-9B2A-A12956B85819}">
+<ds:datastoreItem xmlns:ds="http://schemas.openxmlformats.org/officeDocument/2006/customXml" ds:itemID="{841B9029-2A9E-4B70-8892-A68EFAAABBD2}">
   <ds:schemaRefs>
     <ds:schemaRef ds:uri="http://schemas.microsoft.com/VisualStudio/2011/storyboarding/control"/>
   </ds:schemaRefs>
@@ -51297,7 +51397,7 @@
 </file>
 
 <file path=customXml/itemProps7.xml><?xml version="1.0" encoding="utf-8"?>
-<ds:datastoreItem xmlns:ds="http://schemas.openxmlformats.org/officeDocument/2006/customXml" ds:itemID="{237EF1E1-8A22-40D2-8C34-536459112B06}">
+<ds:datastoreItem xmlns:ds="http://schemas.openxmlformats.org/officeDocument/2006/customXml" ds:itemID="{11AB441A-2E45-4B1C-9012-250459F32BE9}">
   <ds:schemaRefs>
     <ds:schemaRef ds:uri="http://schemas.microsoft.com/VisualStudio/2011/storyboarding/control"/>
   </ds:schemaRefs>

</xml_diff>

<commit_message>
# added big buck bunny license
</commit_message>
<xml_diff>
--- a/CreandoAplicacionesMediaConAzureMediaServices.pptx
+++ b/CreandoAplicacionesMediaConAzureMediaServices.pptx
@@ -6345,7 +6345,7 @@
           <a:graphicData uri="http://schemas.openxmlformats.org/presentationml/2006/ole">
             <mc:AlternateContent xmlns:mc="http://schemas.openxmlformats.org/markup-compatibility/2006">
               <mc:Choice xmlns:v="urn:schemas-microsoft-com:vml" Requires="v">
-                <p:oleObj spid="_x0000_s2204" name="think-cell Slide" r:id="rId9" imgW="360" imgH="360" progId="">
+                <p:oleObj spid="_x0000_s2206" name="think-cell Slide" r:id="rId9" imgW="360" imgH="360" progId="">
                   <p:embed/>
                 </p:oleObj>
               </mc:Choice>
@@ -11120,7 +11120,7 @@
           <a:graphicData uri="http://schemas.openxmlformats.org/presentationml/2006/ole">
             <mc:AlternateContent xmlns:mc="http://schemas.openxmlformats.org/markup-compatibility/2006">
               <mc:Choice xmlns:v="urn:schemas-microsoft-com:vml" Requires="v">
-                <p:oleObj spid="_x0000_s3227" name="think-cell Slide" r:id="rId8" imgW="360" imgH="360" progId="">
+                <p:oleObj spid="_x0000_s3229" name="think-cell Slide" r:id="rId8" imgW="360" imgH="360" progId="">
                   <p:embed/>
                 </p:oleObj>
               </mc:Choice>
@@ -14972,7 +14972,7 @@
           <a:graphicData uri="http://schemas.openxmlformats.org/presentationml/2006/ole">
             <mc:AlternateContent xmlns:mc="http://schemas.openxmlformats.org/markup-compatibility/2006">
               <mc:Choice xmlns:v="urn:schemas-microsoft-com:vml" Requires="v">
-                <p:oleObj spid="_x0000_s4250" name="think-cell Slide" r:id="rId11" imgW="360" imgH="360" progId="">
+                <p:oleObj spid="_x0000_s4252" name="think-cell Slide" r:id="rId11" imgW="360" imgH="360" progId="">
                   <p:embed/>
                 </p:oleObj>
               </mc:Choice>
@@ -20459,7 +20459,7 @@
         </p:nvSpPr>
         <p:spPr>
           <a:xfrm>
-            <a:off x="269240" y="2636912"/>
+            <a:off x="269240" y="2420888"/>
             <a:ext cx="11653521" cy="894996"/>
           </a:xfrm>
         </p:spPr>
@@ -21213,6 +21213,92 @@
           </a:extLst>
         </p:spPr>
       </p:pic>
+      <p:pic>
+        <p:nvPicPr>
+          <p:cNvPr id="2" name="Picture 1"/>
+          <p:cNvPicPr>
+            <a:picLocks noChangeAspect="1"/>
+          </p:cNvPicPr>
+          <p:nvPr/>
+        </p:nvPicPr>
+        <p:blipFill>
+          <a:blip r:embed="rId8">
+            <a:extLst>
+              <a:ext uri="{28A0092B-C50C-407E-A947-70E740481C1C}">
+                <a14:useLocalDpi xmlns:a14="http://schemas.microsoft.com/office/drawing/2010/main" val="0"/>
+              </a:ext>
+            </a:extLst>
+          </a:blip>
+          <a:stretch>
+            <a:fillRect/>
+          </a:stretch>
+        </p:blipFill>
+        <p:spPr>
+          <a:xfrm>
+            <a:off x="5929668" y="3393687"/>
+            <a:ext cx="3073947" cy="2305460"/>
+          </a:xfrm>
+          <a:prstGeom prst="rect">
+            <a:avLst/>
+          </a:prstGeom>
+        </p:spPr>
+      </p:pic>
+      <p:sp>
+        <p:nvSpPr>
+          <p:cNvPr id="3" name="TextBox 2"/>
+          <p:cNvSpPr txBox="1"/>
+          <p:nvPr/>
+        </p:nvSpPr>
+        <p:spPr>
+          <a:xfrm>
+            <a:off x="5880219" y="5714092"/>
+            <a:ext cx="3312125" cy="523220"/>
+          </a:xfrm>
+          <a:prstGeom prst="rect">
+            <a:avLst/>
+          </a:prstGeom>
+          <a:noFill/>
+        </p:spPr>
+        <p:txBody>
+          <a:bodyPr wrap="none" rtlCol="0">
+            <a:spAutoFit/>
+          </a:bodyPr>
+          <a:lstStyle/>
+          <a:p>
+            <a:r>
+              <a:rPr lang="en-US" sz="1400" dirty="0">
+                <a:solidFill>
+                  <a:schemeClr val="bg1"/>
+                </a:solidFill>
+              </a:rPr>
+              <a:t>(c) copyright 2008, Blender </a:t>
+            </a:r>
+            <a:r>
+              <a:rPr lang="en-US" sz="1400" dirty="0" smtClean="0">
+                <a:solidFill>
+                  <a:schemeClr val="bg1"/>
+                </a:solidFill>
+              </a:rPr>
+              <a:t>Foundation </a:t>
+            </a:r>
+          </a:p>
+          <a:p>
+            <a:r>
+              <a:rPr lang="en-US" sz="1400" dirty="0" smtClean="0">
+                <a:solidFill>
+                  <a:schemeClr val="bg1"/>
+                </a:solidFill>
+              </a:rPr>
+              <a:t>www.bigbuckbunny.org</a:t>
+            </a:r>
+            <a:endParaRPr lang="en-US" sz="1400" dirty="0">
+              <a:solidFill>
+                <a:schemeClr val="bg1"/>
+              </a:solidFill>
+            </a:endParaRPr>
+          </a:p>
+        </p:txBody>
+      </p:sp>
     </p:spTree>
     <p:extLst>
       <p:ext uri="{BB962C8B-B14F-4D97-AF65-F5344CB8AC3E}">
@@ -32976,13 +33062,13 @@
   <p:clrMapOvr>
     <a:masterClrMapping/>
   </p:clrMapOvr>
-  <mc:AlternateContent xmlns:mc="http://schemas.openxmlformats.org/markup-compatibility/2006">
-    <mc:Choice xmlns:p14="http://schemas.microsoft.com/office/powerpoint/2010/main" Requires="p14">
+  <mc:AlternateContent xmlns:mc="http://schemas.openxmlformats.org/markup-compatibility/2006" xmlns:p14="http://schemas.microsoft.com/office/powerpoint/2010/main">
+    <mc:Choice Requires="p14">
       <p:transition spd="med" p14:dur="700">
         <p:fade/>
       </p:transition>
     </mc:Choice>
-    <mc:Fallback>
+    <mc:Fallback xmlns="">
       <p:transition spd="med">
         <p:fade/>
       </p:transition>
@@ -48955,7 +49041,7 @@
           <a:graphicData uri="http://schemas.openxmlformats.org/presentationml/2006/ole">
             <mc:AlternateContent xmlns:mc="http://schemas.openxmlformats.org/markup-compatibility/2006">
               <mc:Choice xmlns:v="urn:schemas-microsoft-com:vml" Requires="v">
-                <p:oleObj spid="_x0000_s1178" name="think-cell Slide" r:id="rId7" imgW="360" imgH="360" progId="">
+                <p:oleObj spid="_x0000_s1180" name="think-cell Slide" r:id="rId7" imgW="360" imgH="360" progId="">
                   <p:embed/>
                 </p:oleObj>
               </mc:Choice>
@@ -51308,7 +51394,7 @@
 
 <file path=customXml/item1.xml><?xml version="1.0" encoding="utf-8"?>
 <Control xmlns="http://schemas.microsoft.com/VisualStudio/2011/storyboarding/control">
-  <Id Name="1926977f-ddea-40cd-8909-7dad74082de4" RevisionId="80850475-a21a-4b30-a662-27aac04ef11c" Stencil="48ab8805-b199-4546-a652-7582788c988d" StencilRevisionId="00000000-0000-0000-0000-000000000000" StencilVersion="0.0"/>
+  <Id Name="System.Storyboarding.Icons.Calendar" RevisionId="05cd6d03-c0b2-488e-98a7-d68de69a2cfc" Stencil="System.Storyboarding.Icons" StencilRevisionId="05cd6d03-c0b2-488e-98a7-d68de69a2cfc" StencilVersion="0.1"/>
 </Control>
 </file>
 
@@ -51326,7 +51412,7 @@
 
 <file path=customXml/item4.xml><?xml version="1.0" encoding="utf-8"?>
 <Control xmlns="http://schemas.microsoft.com/VisualStudio/2011/storyboarding/control">
-  <Id Name="System.Storyboarding.Icons.WiFi" RevisionId="05cd6d03-c0b2-488e-98a7-d68de69a2cfc" Stencil="System.Storyboarding.Icons" StencilRevisionId="05cd6d03-c0b2-488e-98a7-d68de69a2cfc" StencilVersion="0.1"/>
+  <Id Name="1926977f-ddea-40cd-8909-7dad74082de4" RevisionId="80850475-a21a-4b30-a662-27aac04ef11c" Stencil="48ab8805-b199-4546-a652-7582788c988d" StencilRevisionId="00000000-0000-0000-0000-000000000000" StencilVersion="0.0"/>
 </Control>
 </file>
 
@@ -51338,18 +51424,18 @@
 
 <file path=customXml/item6.xml><?xml version="1.0" encoding="utf-8"?>
 <Control xmlns="http://schemas.microsoft.com/VisualStudio/2011/storyboarding/control">
-  <Id Name="1926977f-ddea-40cd-8909-7dad74082de4" RevisionId="80850475-a21a-4b30-a662-27aac04ef11c" Stencil="48ab8805-b199-4546-a652-7582788c988d" StencilRevisionId="00000000-0000-0000-0000-000000000000" StencilVersion="0.0"/>
+  <Id Name="System.Storyboarding.Icons.WiFi" RevisionId="05cd6d03-c0b2-488e-98a7-d68de69a2cfc" Stencil="System.Storyboarding.Icons" StencilRevisionId="05cd6d03-c0b2-488e-98a7-d68de69a2cfc" StencilVersion="0.1"/>
 </Control>
 </file>
 
 <file path=customXml/item7.xml><?xml version="1.0" encoding="utf-8"?>
 <Control xmlns="http://schemas.microsoft.com/VisualStudio/2011/storyboarding/control">
-  <Id Name="System.Storyboarding.Icons.Calendar" RevisionId="05cd6d03-c0b2-488e-98a7-d68de69a2cfc" Stencil="System.Storyboarding.Icons" StencilRevisionId="05cd6d03-c0b2-488e-98a7-d68de69a2cfc" StencilVersion="0.1"/>
+  <Id Name="1926977f-ddea-40cd-8909-7dad74082de4" RevisionId="80850475-a21a-4b30-a662-27aac04ef11c" Stencil="48ab8805-b199-4546-a652-7582788c988d" StencilRevisionId="00000000-0000-0000-0000-000000000000" StencilVersion="0.0"/>
 </Control>
 </file>
 
 <file path=customXml/itemProps1.xml><?xml version="1.0" encoding="utf-8"?>
-<ds:datastoreItem xmlns:ds="http://schemas.openxmlformats.org/officeDocument/2006/customXml" ds:itemID="{237EF1E1-8A22-40D2-8C34-536459112B06}">
+<ds:datastoreItem xmlns:ds="http://schemas.openxmlformats.org/officeDocument/2006/customXml" ds:itemID="{11AB441A-2E45-4B1C-9012-250459F32BE9}">
   <ds:schemaRefs>
     <ds:schemaRef ds:uri="http://schemas.microsoft.com/VisualStudio/2011/storyboarding/control"/>
   </ds:schemaRefs>
@@ -51365,7 +51451,7 @@
 </file>
 
 <file path=customXml/itemProps3.xml><?xml version="1.0" encoding="utf-8"?>
-<ds:datastoreItem xmlns:ds="http://schemas.openxmlformats.org/officeDocument/2006/customXml" ds:itemID="{7C02861A-927D-43AD-9F4D-F91F9940836C}">
+<ds:datastoreItem xmlns:ds="http://schemas.openxmlformats.org/officeDocument/2006/customXml" ds:itemID="{237EF1E1-8A22-40D2-8C34-536459112B06}">
   <ds:schemaRefs>
     <ds:schemaRef ds:uri="http://schemas.microsoft.com/VisualStudio/2011/storyboarding/control"/>
   </ds:schemaRefs>
@@ -51373,7 +51459,7 @@
 </file>
 
 <file path=customXml/itemProps4.xml><?xml version="1.0" encoding="utf-8"?>
-<ds:datastoreItem xmlns:ds="http://schemas.openxmlformats.org/officeDocument/2006/customXml" ds:itemID="{EE60156C-2B7F-42C4-9B2A-A12956B85819}">
+<ds:datastoreItem xmlns:ds="http://schemas.openxmlformats.org/officeDocument/2006/customXml" ds:itemID="{841B9029-2A9E-4B70-8892-A68EFAAABBD2}">
   <ds:schemaRefs>
     <ds:schemaRef ds:uri="http://schemas.microsoft.com/VisualStudio/2011/storyboarding/control"/>
   </ds:schemaRefs>
@@ -51389,7 +51475,7 @@
 </file>
 
 <file path=customXml/itemProps6.xml><?xml version="1.0" encoding="utf-8"?>
-<ds:datastoreItem xmlns:ds="http://schemas.openxmlformats.org/officeDocument/2006/customXml" ds:itemID="{841B9029-2A9E-4B70-8892-A68EFAAABBD2}">
+<ds:datastoreItem xmlns:ds="http://schemas.openxmlformats.org/officeDocument/2006/customXml" ds:itemID="{EE60156C-2B7F-42C4-9B2A-A12956B85819}">
   <ds:schemaRefs>
     <ds:schemaRef ds:uri="http://schemas.microsoft.com/VisualStudio/2011/storyboarding/control"/>
   </ds:schemaRefs>
@@ -51397,7 +51483,7 @@
 </file>
 
 <file path=customXml/itemProps7.xml><?xml version="1.0" encoding="utf-8"?>
-<ds:datastoreItem xmlns:ds="http://schemas.openxmlformats.org/officeDocument/2006/customXml" ds:itemID="{11AB441A-2E45-4B1C-9012-250459F32BE9}">
+<ds:datastoreItem xmlns:ds="http://schemas.openxmlformats.org/officeDocument/2006/customXml" ds:itemID="{7C02861A-927D-43AD-9F4D-F91F9940836C}">
   <ds:schemaRefs>
     <ds:schemaRef ds:uri="http://schemas.microsoft.com/VisualStudio/2011/storyboarding/control"/>
   </ds:schemaRefs>

</xml_diff>